<commit_message>
Added missing explanation about solution
</commit_message>
<xml_diff>
--- a/Sign up system notes.pptx
+++ b/Sign up system notes.pptx
@@ -144,7 +144,7 @@
           <p:cNvPr id="2" name="Title 1">
             <a:extLst>
               <a:ext uri="{FF2B5EF4-FFF2-40B4-BE49-F238E27FC236}">
-                <a16:creationId xmlns:a16="http://schemas.microsoft.com/office/drawing/2014/main" xmlns="" id="{95DFF198-D229-44E1-8966-3EAD8BD5A7CC}"/>
+                <a16:creationId xmlns:a16="http://schemas.microsoft.com/office/drawing/2014/main" id="{95DFF198-D229-44E1-8966-3EAD8BD5A7CC}"/>
               </a:ext>
             </a:extLst>
           </p:cNvPr>
@@ -181,7 +181,7 @@
           <p:cNvPr id="3" name="Subtitle 2">
             <a:extLst>
               <a:ext uri="{FF2B5EF4-FFF2-40B4-BE49-F238E27FC236}">
-                <a16:creationId xmlns:a16="http://schemas.microsoft.com/office/drawing/2014/main" xmlns="" id="{5BF699BA-6651-4DF2-8F38-4E3C8F814A85}"/>
+                <a16:creationId xmlns:a16="http://schemas.microsoft.com/office/drawing/2014/main" id="{5BF699BA-6651-4DF2-8F38-4E3C8F814A85}"/>
               </a:ext>
             </a:extLst>
           </p:cNvPr>
@@ -251,7 +251,7 @@
           <p:cNvPr id="4" name="Date Placeholder 3">
             <a:extLst>
               <a:ext uri="{FF2B5EF4-FFF2-40B4-BE49-F238E27FC236}">
-                <a16:creationId xmlns:a16="http://schemas.microsoft.com/office/drawing/2014/main" xmlns="" id="{AC3CB4D5-7C65-4E08-A22F-74BD38423DDE}"/>
+                <a16:creationId xmlns:a16="http://schemas.microsoft.com/office/drawing/2014/main" id="{AC3CB4D5-7C65-4E08-A22F-74BD38423DDE}"/>
               </a:ext>
             </a:extLst>
           </p:cNvPr>
@@ -269,7 +269,7 @@
           <a:p>
             <a:fld id="{8EC706C8-D35E-4DF4-BED8-A06440662B0A}" type="datetimeFigureOut">
               <a:rPr lang="en-US" smtClean="0"/>
-              <a:t>18-Aug-18</a:t>
+              <a:t>19-Aug-18</a:t>
             </a:fld>
             <a:endParaRPr lang="en-US"/>
           </a:p>
@@ -280,7 +280,7 @@
           <p:cNvPr id="5" name="Footer Placeholder 4">
             <a:extLst>
               <a:ext uri="{FF2B5EF4-FFF2-40B4-BE49-F238E27FC236}">
-                <a16:creationId xmlns:a16="http://schemas.microsoft.com/office/drawing/2014/main" xmlns="" id="{983817F6-0C03-42B5-923B-007192535510}"/>
+                <a16:creationId xmlns:a16="http://schemas.microsoft.com/office/drawing/2014/main" id="{983817F6-0C03-42B5-923B-007192535510}"/>
               </a:ext>
             </a:extLst>
           </p:cNvPr>
@@ -305,7 +305,7 @@
           <p:cNvPr id="6" name="Slide Number Placeholder 5">
             <a:extLst>
               <a:ext uri="{FF2B5EF4-FFF2-40B4-BE49-F238E27FC236}">
-                <a16:creationId xmlns:a16="http://schemas.microsoft.com/office/drawing/2014/main" xmlns="" id="{D334EC77-AF98-42BA-8F84-7F157DCFC6B9}"/>
+                <a16:creationId xmlns:a16="http://schemas.microsoft.com/office/drawing/2014/main" id="{D334EC77-AF98-42BA-8F84-7F157DCFC6B9}"/>
               </a:ext>
             </a:extLst>
           </p:cNvPr>
@@ -364,7 +364,7 @@
           <p:cNvPr id="2" name="Title 1">
             <a:extLst>
               <a:ext uri="{FF2B5EF4-FFF2-40B4-BE49-F238E27FC236}">
-                <a16:creationId xmlns:a16="http://schemas.microsoft.com/office/drawing/2014/main" xmlns="" id="{E08E9F48-CECD-4E0D-96A0-6B8D29F17E7C}"/>
+                <a16:creationId xmlns:a16="http://schemas.microsoft.com/office/drawing/2014/main" id="{E08E9F48-CECD-4E0D-96A0-6B8D29F17E7C}"/>
               </a:ext>
             </a:extLst>
           </p:cNvPr>
@@ -392,7 +392,7 @@
           <p:cNvPr id="3" name="Vertical Text Placeholder 2">
             <a:extLst>
               <a:ext uri="{FF2B5EF4-FFF2-40B4-BE49-F238E27FC236}">
-                <a16:creationId xmlns:a16="http://schemas.microsoft.com/office/drawing/2014/main" xmlns="" id="{40666372-3567-480B-A9FC-948E8A3E2F4A}"/>
+                <a16:creationId xmlns:a16="http://schemas.microsoft.com/office/drawing/2014/main" id="{40666372-3567-480B-A9FC-948E8A3E2F4A}"/>
               </a:ext>
             </a:extLst>
           </p:cNvPr>
@@ -449,7 +449,7 @@
           <p:cNvPr id="4" name="Date Placeholder 3">
             <a:extLst>
               <a:ext uri="{FF2B5EF4-FFF2-40B4-BE49-F238E27FC236}">
-                <a16:creationId xmlns:a16="http://schemas.microsoft.com/office/drawing/2014/main" xmlns="" id="{69CD2C0D-FCEE-4D07-A810-E0FE7762625B}"/>
+                <a16:creationId xmlns:a16="http://schemas.microsoft.com/office/drawing/2014/main" id="{69CD2C0D-FCEE-4D07-A810-E0FE7762625B}"/>
               </a:ext>
             </a:extLst>
           </p:cNvPr>
@@ -467,7 +467,7 @@
           <a:p>
             <a:fld id="{8EC706C8-D35E-4DF4-BED8-A06440662B0A}" type="datetimeFigureOut">
               <a:rPr lang="en-US" smtClean="0"/>
-              <a:t>18-Aug-18</a:t>
+              <a:t>19-Aug-18</a:t>
             </a:fld>
             <a:endParaRPr lang="en-US"/>
           </a:p>
@@ -478,7 +478,7 @@
           <p:cNvPr id="5" name="Footer Placeholder 4">
             <a:extLst>
               <a:ext uri="{FF2B5EF4-FFF2-40B4-BE49-F238E27FC236}">
-                <a16:creationId xmlns:a16="http://schemas.microsoft.com/office/drawing/2014/main" xmlns="" id="{FFCCCFBE-F4A7-43EA-88A5-3A03CE9D7E82}"/>
+                <a16:creationId xmlns:a16="http://schemas.microsoft.com/office/drawing/2014/main" id="{FFCCCFBE-F4A7-43EA-88A5-3A03CE9D7E82}"/>
               </a:ext>
             </a:extLst>
           </p:cNvPr>
@@ -503,7 +503,7 @@
           <p:cNvPr id="6" name="Slide Number Placeholder 5">
             <a:extLst>
               <a:ext uri="{FF2B5EF4-FFF2-40B4-BE49-F238E27FC236}">
-                <a16:creationId xmlns:a16="http://schemas.microsoft.com/office/drawing/2014/main" xmlns="" id="{025DAD61-F9F6-485A-944C-40FE15B0F027}"/>
+                <a16:creationId xmlns:a16="http://schemas.microsoft.com/office/drawing/2014/main" id="{025DAD61-F9F6-485A-944C-40FE15B0F027}"/>
               </a:ext>
             </a:extLst>
           </p:cNvPr>
@@ -562,7 +562,7 @@
           <p:cNvPr id="2" name="Vertical Title 1">
             <a:extLst>
               <a:ext uri="{FF2B5EF4-FFF2-40B4-BE49-F238E27FC236}">
-                <a16:creationId xmlns:a16="http://schemas.microsoft.com/office/drawing/2014/main" xmlns="" id="{18DAEAB2-F03B-4AB4-B0F3-7A711A712099}"/>
+                <a16:creationId xmlns:a16="http://schemas.microsoft.com/office/drawing/2014/main" id="{18DAEAB2-F03B-4AB4-B0F3-7A711A712099}"/>
               </a:ext>
             </a:extLst>
           </p:cNvPr>
@@ -595,7 +595,7 @@
           <p:cNvPr id="3" name="Vertical Text Placeholder 2">
             <a:extLst>
               <a:ext uri="{FF2B5EF4-FFF2-40B4-BE49-F238E27FC236}">
-                <a16:creationId xmlns:a16="http://schemas.microsoft.com/office/drawing/2014/main" xmlns="" id="{668B1C9C-F451-48D9-AA93-D8FCB08F8B27}"/>
+                <a16:creationId xmlns:a16="http://schemas.microsoft.com/office/drawing/2014/main" id="{668B1C9C-F451-48D9-AA93-D8FCB08F8B27}"/>
               </a:ext>
             </a:extLst>
           </p:cNvPr>
@@ -657,7 +657,7 @@
           <p:cNvPr id="4" name="Date Placeholder 3">
             <a:extLst>
               <a:ext uri="{FF2B5EF4-FFF2-40B4-BE49-F238E27FC236}">
-                <a16:creationId xmlns:a16="http://schemas.microsoft.com/office/drawing/2014/main" xmlns="" id="{6B870396-2CB4-4161-A0D2-4A692B12DA2C}"/>
+                <a16:creationId xmlns:a16="http://schemas.microsoft.com/office/drawing/2014/main" id="{6B870396-2CB4-4161-A0D2-4A692B12DA2C}"/>
               </a:ext>
             </a:extLst>
           </p:cNvPr>
@@ -675,7 +675,7 @@
           <a:p>
             <a:fld id="{8EC706C8-D35E-4DF4-BED8-A06440662B0A}" type="datetimeFigureOut">
               <a:rPr lang="en-US" smtClean="0"/>
-              <a:t>18-Aug-18</a:t>
+              <a:t>19-Aug-18</a:t>
             </a:fld>
             <a:endParaRPr lang="en-US"/>
           </a:p>
@@ -686,7 +686,7 @@
           <p:cNvPr id="5" name="Footer Placeholder 4">
             <a:extLst>
               <a:ext uri="{FF2B5EF4-FFF2-40B4-BE49-F238E27FC236}">
-                <a16:creationId xmlns:a16="http://schemas.microsoft.com/office/drawing/2014/main" xmlns="" id="{6A8A8C4F-428A-41DD-A375-2C4B2ACCD145}"/>
+                <a16:creationId xmlns:a16="http://schemas.microsoft.com/office/drawing/2014/main" id="{6A8A8C4F-428A-41DD-A375-2C4B2ACCD145}"/>
               </a:ext>
             </a:extLst>
           </p:cNvPr>
@@ -711,7 +711,7 @@
           <p:cNvPr id="6" name="Slide Number Placeholder 5">
             <a:extLst>
               <a:ext uri="{FF2B5EF4-FFF2-40B4-BE49-F238E27FC236}">
-                <a16:creationId xmlns:a16="http://schemas.microsoft.com/office/drawing/2014/main" xmlns="" id="{0D2817E7-482D-4D67-855F-71AB89D7454E}"/>
+                <a16:creationId xmlns:a16="http://schemas.microsoft.com/office/drawing/2014/main" id="{0D2817E7-482D-4D67-855F-71AB89D7454E}"/>
               </a:ext>
             </a:extLst>
           </p:cNvPr>
@@ -770,7 +770,7 @@
           <p:cNvPr id="2" name="Title 1">
             <a:extLst>
               <a:ext uri="{FF2B5EF4-FFF2-40B4-BE49-F238E27FC236}">
-                <a16:creationId xmlns:a16="http://schemas.microsoft.com/office/drawing/2014/main" xmlns="" id="{D41056E8-AF04-4DDA-BB6A-09BF79C9DC07}"/>
+                <a16:creationId xmlns:a16="http://schemas.microsoft.com/office/drawing/2014/main" id="{D41056E8-AF04-4DDA-BB6A-09BF79C9DC07}"/>
               </a:ext>
             </a:extLst>
           </p:cNvPr>
@@ -798,7 +798,7 @@
           <p:cNvPr id="3" name="Content Placeholder 2">
             <a:extLst>
               <a:ext uri="{FF2B5EF4-FFF2-40B4-BE49-F238E27FC236}">
-                <a16:creationId xmlns:a16="http://schemas.microsoft.com/office/drawing/2014/main" xmlns="" id="{C8013ED9-D47B-4150-8518-D1F3E69F02C2}"/>
+                <a16:creationId xmlns:a16="http://schemas.microsoft.com/office/drawing/2014/main" id="{C8013ED9-D47B-4150-8518-D1F3E69F02C2}"/>
               </a:ext>
             </a:extLst>
           </p:cNvPr>
@@ -855,7 +855,7 @@
           <p:cNvPr id="4" name="Date Placeholder 3">
             <a:extLst>
               <a:ext uri="{FF2B5EF4-FFF2-40B4-BE49-F238E27FC236}">
-                <a16:creationId xmlns:a16="http://schemas.microsoft.com/office/drawing/2014/main" xmlns="" id="{B198F19D-7E31-4A07-A6EC-3713D02D9F0D}"/>
+                <a16:creationId xmlns:a16="http://schemas.microsoft.com/office/drawing/2014/main" id="{B198F19D-7E31-4A07-A6EC-3713D02D9F0D}"/>
               </a:ext>
             </a:extLst>
           </p:cNvPr>
@@ -873,7 +873,7 @@
           <a:p>
             <a:fld id="{8EC706C8-D35E-4DF4-BED8-A06440662B0A}" type="datetimeFigureOut">
               <a:rPr lang="en-US" smtClean="0"/>
-              <a:t>18-Aug-18</a:t>
+              <a:t>19-Aug-18</a:t>
             </a:fld>
             <a:endParaRPr lang="en-US"/>
           </a:p>
@@ -884,7 +884,7 @@
           <p:cNvPr id="5" name="Footer Placeholder 4">
             <a:extLst>
               <a:ext uri="{FF2B5EF4-FFF2-40B4-BE49-F238E27FC236}">
-                <a16:creationId xmlns:a16="http://schemas.microsoft.com/office/drawing/2014/main" xmlns="" id="{59F7E539-E848-4B95-BA7C-441475D994CA}"/>
+                <a16:creationId xmlns:a16="http://schemas.microsoft.com/office/drawing/2014/main" id="{59F7E539-E848-4B95-BA7C-441475D994CA}"/>
               </a:ext>
             </a:extLst>
           </p:cNvPr>
@@ -909,7 +909,7 @@
           <p:cNvPr id="6" name="Slide Number Placeholder 5">
             <a:extLst>
               <a:ext uri="{FF2B5EF4-FFF2-40B4-BE49-F238E27FC236}">
-                <a16:creationId xmlns:a16="http://schemas.microsoft.com/office/drawing/2014/main" xmlns="" id="{A263F682-C9D4-400B-8061-C76E6186CC26}"/>
+                <a16:creationId xmlns:a16="http://schemas.microsoft.com/office/drawing/2014/main" id="{A263F682-C9D4-400B-8061-C76E6186CC26}"/>
               </a:ext>
             </a:extLst>
           </p:cNvPr>
@@ -968,7 +968,7 @@
           <p:cNvPr id="2" name="Title 1">
             <a:extLst>
               <a:ext uri="{FF2B5EF4-FFF2-40B4-BE49-F238E27FC236}">
-                <a16:creationId xmlns:a16="http://schemas.microsoft.com/office/drawing/2014/main" xmlns="" id="{D697B10D-8750-4F20-AE9D-0D1840E9CA28}"/>
+                <a16:creationId xmlns:a16="http://schemas.microsoft.com/office/drawing/2014/main" id="{D697B10D-8750-4F20-AE9D-0D1840E9CA28}"/>
               </a:ext>
             </a:extLst>
           </p:cNvPr>
@@ -1005,7 +1005,7 @@
           <p:cNvPr id="3" name="Text Placeholder 2">
             <a:extLst>
               <a:ext uri="{FF2B5EF4-FFF2-40B4-BE49-F238E27FC236}">
-                <a16:creationId xmlns:a16="http://schemas.microsoft.com/office/drawing/2014/main" xmlns="" id="{6E2E5FFE-8B9C-474F-85FA-90A47A43C590}"/>
+                <a16:creationId xmlns:a16="http://schemas.microsoft.com/office/drawing/2014/main" id="{6E2E5FFE-8B9C-474F-85FA-90A47A43C590}"/>
               </a:ext>
             </a:extLst>
           </p:cNvPr>
@@ -1130,7 +1130,7 @@
           <p:cNvPr id="4" name="Date Placeholder 3">
             <a:extLst>
               <a:ext uri="{FF2B5EF4-FFF2-40B4-BE49-F238E27FC236}">
-                <a16:creationId xmlns:a16="http://schemas.microsoft.com/office/drawing/2014/main" xmlns="" id="{A132CA8D-9F70-4B52-BBA0-BF52EDC2C687}"/>
+                <a16:creationId xmlns:a16="http://schemas.microsoft.com/office/drawing/2014/main" id="{A132CA8D-9F70-4B52-BBA0-BF52EDC2C687}"/>
               </a:ext>
             </a:extLst>
           </p:cNvPr>
@@ -1148,7 +1148,7 @@
           <a:p>
             <a:fld id="{8EC706C8-D35E-4DF4-BED8-A06440662B0A}" type="datetimeFigureOut">
               <a:rPr lang="en-US" smtClean="0"/>
-              <a:t>18-Aug-18</a:t>
+              <a:t>19-Aug-18</a:t>
             </a:fld>
             <a:endParaRPr lang="en-US"/>
           </a:p>
@@ -1159,7 +1159,7 @@
           <p:cNvPr id="5" name="Footer Placeholder 4">
             <a:extLst>
               <a:ext uri="{FF2B5EF4-FFF2-40B4-BE49-F238E27FC236}">
-                <a16:creationId xmlns:a16="http://schemas.microsoft.com/office/drawing/2014/main" xmlns="" id="{0C1D0205-4689-4B71-A4E8-A08686654B4D}"/>
+                <a16:creationId xmlns:a16="http://schemas.microsoft.com/office/drawing/2014/main" id="{0C1D0205-4689-4B71-A4E8-A08686654B4D}"/>
               </a:ext>
             </a:extLst>
           </p:cNvPr>
@@ -1184,7 +1184,7 @@
           <p:cNvPr id="6" name="Slide Number Placeholder 5">
             <a:extLst>
               <a:ext uri="{FF2B5EF4-FFF2-40B4-BE49-F238E27FC236}">
-                <a16:creationId xmlns:a16="http://schemas.microsoft.com/office/drawing/2014/main" xmlns="" id="{DF574FE7-6DF9-4ECF-8D1D-08F5F3EB1BAF}"/>
+                <a16:creationId xmlns:a16="http://schemas.microsoft.com/office/drawing/2014/main" id="{DF574FE7-6DF9-4ECF-8D1D-08F5F3EB1BAF}"/>
               </a:ext>
             </a:extLst>
           </p:cNvPr>
@@ -1243,7 +1243,7 @@
           <p:cNvPr id="2" name="Title 1">
             <a:extLst>
               <a:ext uri="{FF2B5EF4-FFF2-40B4-BE49-F238E27FC236}">
-                <a16:creationId xmlns:a16="http://schemas.microsoft.com/office/drawing/2014/main" xmlns="" id="{16C3AFDC-BC13-4A12-A085-37527BB7A335}"/>
+                <a16:creationId xmlns:a16="http://schemas.microsoft.com/office/drawing/2014/main" id="{16C3AFDC-BC13-4A12-A085-37527BB7A335}"/>
               </a:ext>
             </a:extLst>
           </p:cNvPr>
@@ -1271,7 +1271,7 @@
           <p:cNvPr id="3" name="Content Placeholder 2">
             <a:extLst>
               <a:ext uri="{FF2B5EF4-FFF2-40B4-BE49-F238E27FC236}">
-                <a16:creationId xmlns:a16="http://schemas.microsoft.com/office/drawing/2014/main" xmlns="" id="{38854E43-894C-4E99-A6E5-FE8F036D292D}"/>
+                <a16:creationId xmlns:a16="http://schemas.microsoft.com/office/drawing/2014/main" id="{38854E43-894C-4E99-A6E5-FE8F036D292D}"/>
               </a:ext>
             </a:extLst>
           </p:cNvPr>
@@ -1333,7 +1333,7 @@
           <p:cNvPr id="4" name="Content Placeholder 3">
             <a:extLst>
               <a:ext uri="{FF2B5EF4-FFF2-40B4-BE49-F238E27FC236}">
-                <a16:creationId xmlns:a16="http://schemas.microsoft.com/office/drawing/2014/main" xmlns="" id="{A1417FC2-FF25-43D6-A63F-D9337260BB3B}"/>
+                <a16:creationId xmlns:a16="http://schemas.microsoft.com/office/drawing/2014/main" id="{A1417FC2-FF25-43D6-A63F-D9337260BB3B}"/>
               </a:ext>
             </a:extLst>
           </p:cNvPr>
@@ -1395,7 +1395,7 @@
           <p:cNvPr id="5" name="Date Placeholder 4">
             <a:extLst>
               <a:ext uri="{FF2B5EF4-FFF2-40B4-BE49-F238E27FC236}">
-                <a16:creationId xmlns:a16="http://schemas.microsoft.com/office/drawing/2014/main" xmlns="" id="{3529ADA7-D65B-4233-BE86-CADCA1431EEA}"/>
+                <a16:creationId xmlns:a16="http://schemas.microsoft.com/office/drawing/2014/main" id="{3529ADA7-D65B-4233-BE86-CADCA1431EEA}"/>
               </a:ext>
             </a:extLst>
           </p:cNvPr>
@@ -1413,7 +1413,7 @@
           <a:p>
             <a:fld id="{8EC706C8-D35E-4DF4-BED8-A06440662B0A}" type="datetimeFigureOut">
               <a:rPr lang="en-US" smtClean="0"/>
-              <a:t>18-Aug-18</a:t>
+              <a:t>19-Aug-18</a:t>
             </a:fld>
             <a:endParaRPr lang="en-US"/>
           </a:p>
@@ -1424,7 +1424,7 @@
           <p:cNvPr id="6" name="Footer Placeholder 5">
             <a:extLst>
               <a:ext uri="{FF2B5EF4-FFF2-40B4-BE49-F238E27FC236}">
-                <a16:creationId xmlns:a16="http://schemas.microsoft.com/office/drawing/2014/main" xmlns="" id="{1573A127-AC74-447F-A72B-27F6A222D1C2}"/>
+                <a16:creationId xmlns:a16="http://schemas.microsoft.com/office/drawing/2014/main" id="{1573A127-AC74-447F-A72B-27F6A222D1C2}"/>
               </a:ext>
             </a:extLst>
           </p:cNvPr>
@@ -1449,7 +1449,7 @@
           <p:cNvPr id="7" name="Slide Number Placeholder 6">
             <a:extLst>
               <a:ext uri="{FF2B5EF4-FFF2-40B4-BE49-F238E27FC236}">
-                <a16:creationId xmlns:a16="http://schemas.microsoft.com/office/drawing/2014/main" xmlns="" id="{450473C6-DAD2-402A-9A36-395A59CC80C4}"/>
+                <a16:creationId xmlns:a16="http://schemas.microsoft.com/office/drawing/2014/main" id="{450473C6-DAD2-402A-9A36-395A59CC80C4}"/>
               </a:ext>
             </a:extLst>
           </p:cNvPr>
@@ -1508,7 +1508,7 @@
           <p:cNvPr id="2" name="Title 1">
             <a:extLst>
               <a:ext uri="{FF2B5EF4-FFF2-40B4-BE49-F238E27FC236}">
-                <a16:creationId xmlns:a16="http://schemas.microsoft.com/office/drawing/2014/main" xmlns="" id="{C89F040E-BC2F-4C85-8CD0-00DCC69C2A95}"/>
+                <a16:creationId xmlns:a16="http://schemas.microsoft.com/office/drawing/2014/main" id="{C89F040E-BC2F-4C85-8CD0-00DCC69C2A95}"/>
               </a:ext>
             </a:extLst>
           </p:cNvPr>
@@ -1541,7 +1541,7 @@
           <p:cNvPr id="3" name="Text Placeholder 2">
             <a:extLst>
               <a:ext uri="{FF2B5EF4-FFF2-40B4-BE49-F238E27FC236}">
-                <a16:creationId xmlns:a16="http://schemas.microsoft.com/office/drawing/2014/main" xmlns="" id="{26715C69-C9A6-46BE-99A1-5C8F5F32F710}"/>
+                <a16:creationId xmlns:a16="http://schemas.microsoft.com/office/drawing/2014/main" id="{26715C69-C9A6-46BE-99A1-5C8F5F32F710}"/>
               </a:ext>
             </a:extLst>
           </p:cNvPr>
@@ -1612,7 +1612,7 @@
           <p:cNvPr id="4" name="Content Placeholder 3">
             <a:extLst>
               <a:ext uri="{FF2B5EF4-FFF2-40B4-BE49-F238E27FC236}">
-                <a16:creationId xmlns:a16="http://schemas.microsoft.com/office/drawing/2014/main" xmlns="" id="{9EA82066-9CFF-4FD0-846A-759D9A959562}"/>
+                <a16:creationId xmlns:a16="http://schemas.microsoft.com/office/drawing/2014/main" id="{9EA82066-9CFF-4FD0-846A-759D9A959562}"/>
               </a:ext>
             </a:extLst>
           </p:cNvPr>
@@ -1674,7 +1674,7 @@
           <p:cNvPr id="5" name="Text Placeholder 4">
             <a:extLst>
               <a:ext uri="{FF2B5EF4-FFF2-40B4-BE49-F238E27FC236}">
-                <a16:creationId xmlns:a16="http://schemas.microsoft.com/office/drawing/2014/main" xmlns="" id="{B4C2A434-A7C0-4F04-9C4F-99553E7D940B}"/>
+                <a16:creationId xmlns:a16="http://schemas.microsoft.com/office/drawing/2014/main" id="{B4C2A434-A7C0-4F04-9C4F-99553E7D940B}"/>
               </a:ext>
             </a:extLst>
           </p:cNvPr>
@@ -1745,7 +1745,7 @@
           <p:cNvPr id="6" name="Content Placeholder 5">
             <a:extLst>
               <a:ext uri="{FF2B5EF4-FFF2-40B4-BE49-F238E27FC236}">
-                <a16:creationId xmlns:a16="http://schemas.microsoft.com/office/drawing/2014/main" xmlns="" id="{36815EF3-6559-45FB-A9E0-8E5B37DDE876}"/>
+                <a16:creationId xmlns:a16="http://schemas.microsoft.com/office/drawing/2014/main" id="{36815EF3-6559-45FB-A9E0-8E5B37DDE876}"/>
               </a:ext>
             </a:extLst>
           </p:cNvPr>
@@ -1807,7 +1807,7 @@
           <p:cNvPr id="7" name="Date Placeholder 6">
             <a:extLst>
               <a:ext uri="{FF2B5EF4-FFF2-40B4-BE49-F238E27FC236}">
-                <a16:creationId xmlns:a16="http://schemas.microsoft.com/office/drawing/2014/main" xmlns="" id="{069A06AB-E059-4721-BB90-D15377A497C3}"/>
+                <a16:creationId xmlns:a16="http://schemas.microsoft.com/office/drawing/2014/main" id="{069A06AB-E059-4721-BB90-D15377A497C3}"/>
               </a:ext>
             </a:extLst>
           </p:cNvPr>
@@ -1825,7 +1825,7 @@
           <a:p>
             <a:fld id="{8EC706C8-D35E-4DF4-BED8-A06440662B0A}" type="datetimeFigureOut">
               <a:rPr lang="en-US" smtClean="0"/>
-              <a:t>18-Aug-18</a:t>
+              <a:t>19-Aug-18</a:t>
             </a:fld>
             <a:endParaRPr lang="en-US"/>
           </a:p>
@@ -1836,7 +1836,7 @@
           <p:cNvPr id="8" name="Footer Placeholder 7">
             <a:extLst>
               <a:ext uri="{FF2B5EF4-FFF2-40B4-BE49-F238E27FC236}">
-                <a16:creationId xmlns:a16="http://schemas.microsoft.com/office/drawing/2014/main" xmlns="" id="{72A557B8-9713-41AE-9B65-8872F0367776}"/>
+                <a16:creationId xmlns:a16="http://schemas.microsoft.com/office/drawing/2014/main" id="{72A557B8-9713-41AE-9B65-8872F0367776}"/>
               </a:ext>
             </a:extLst>
           </p:cNvPr>
@@ -1861,7 +1861,7 @@
           <p:cNvPr id="9" name="Slide Number Placeholder 8">
             <a:extLst>
               <a:ext uri="{FF2B5EF4-FFF2-40B4-BE49-F238E27FC236}">
-                <a16:creationId xmlns:a16="http://schemas.microsoft.com/office/drawing/2014/main" xmlns="" id="{B860BD47-734C-4A7B-84D9-71A6AD81BDBC}"/>
+                <a16:creationId xmlns:a16="http://schemas.microsoft.com/office/drawing/2014/main" id="{B860BD47-734C-4A7B-84D9-71A6AD81BDBC}"/>
               </a:ext>
             </a:extLst>
           </p:cNvPr>
@@ -1920,7 +1920,7 @@
           <p:cNvPr id="2" name="Title 1">
             <a:extLst>
               <a:ext uri="{FF2B5EF4-FFF2-40B4-BE49-F238E27FC236}">
-                <a16:creationId xmlns:a16="http://schemas.microsoft.com/office/drawing/2014/main" xmlns="" id="{DE2FA800-E90D-4615-9FD6-9AF1BC3CDF50}"/>
+                <a16:creationId xmlns:a16="http://schemas.microsoft.com/office/drawing/2014/main" id="{DE2FA800-E90D-4615-9FD6-9AF1BC3CDF50}"/>
               </a:ext>
             </a:extLst>
           </p:cNvPr>
@@ -1948,7 +1948,7 @@
           <p:cNvPr id="3" name="Date Placeholder 2">
             <a:extLst>
               <a:ext uri="{FF2B5EF4-FFF2-40B4-BE49-F238E27FC236}">
-                <a16:creationId xmlns:a16="http://schemas.microsoft.com/office/drawing/2014/main" xmlns="" id="{18F20C80-A14C-4A3D-B7F4-1290B656DEFF}"/>
+                <a16:creationId xmlns:a16="http://schemas.microsoft.com/office/drawing/2014/main" id="{18F20C80-A14C-4A3D-B7F4-1290B656DEFF}"/>
               </a:ext>
             </a:extLst>
           </p:cNvPr>
@@ -1966,7 +1966,7 @@
           <a:p>
             <a:fld id="{8EC706C8-D35E-4DF4-BED8-A06440662B0A}" type="datetimeFigureOut">
               <a:rPr lang="en-US" smtClean="0"/>
-              <a:t>18-Aug-18</a:t>
+              <a:t>19-Aug-18</a:t>
             </a:fld>
             <a:endParaRPr lang="en-US"/>
           </a:p>
@@ -1977,7 +1977,7 @@
           <p:cNvPr id="4" name="Footer Placeholder 3">
             <a:extLst>
               <a:ext uri="{FF2B5EF4-FFF2-40B4-BE49-F238E27FC236}">
-                <a16:creationId xmlns:a16="http://schemas.microsoft.com/office/drawing/2014/main" xmlns="" id="{C0DD1441-E188-460B-B0AF-501487311C1C}"/>
+                <a16:creationId xmlns:a16="http://schemas.microsoft.com/office/drawing/2014/main" id="{C0DD1441-E188-460B-B0AF-501487311C1C}"/>
               </a:ext>
             </a:extLst>
           </p:cNvPr>
@@ -2002,7 +2002,7 @@
           <p:cNvPr id="5" name="Slide Number Placeholder 4">
             <a:extLst>
               <a:ext uri="{FF2B5EF4-FFF2-40B4-BE49-F238E27FC236}">
-                <a16:creationId xmlns:a16="http://schemas.microsoft.com/office/drawing/2014/main" xmlns="" id="{BA0E7E54-D95C-4730-8735-D71B1D7FB890}"/>
+                <a16:creationId xmlns:a16="http://schemas.microsoft.com/office/drawing/2014/main" id="{BA0E7E54-D95C-4730-8735-D71B1D7FB890}"/>
               </a:ext>
             </a:extLst>
           </p:cNvPr>
@@ -2061,7 +2061,7 @@
           <p:cNvPr id="2" name="Date Placeholder 1">
             <a:extLst>
               <a:ext uri="{FF2B5EF4-FFF2-40B4-BE49-F238E27FC236}">
-                <a16:creationId xmlns:a16="http://schemas.microsoft.com/office/drawing/2014/main" xmlns="" id="{6C2E99CF-9471-4EFF-AE0E-07E852FE5D52}"/>
+                <a16:creationId xmlns:a16="http://schemas.microsoft.com/office/drawing/2014/main" id="{6C2E99CF-9471-4EFF-AE0E-07E852FE5D52}"/>
               </a:ext>
             </a:extLst>
           </p:cNvPr>
@@ -2079,7 +2079,7 @@
           <a:p>
             <a:fld id="{8EC706C8-D35E-4DF4-BED8-A06440662B0A}" type="datetimeFigureOut">
               <a:rPr lang="en-US" smtClean="0"/>
-              <a:t>18-Aug-18</a:t>
+              <a:t>19-Aug-18</a:t>
             </a:fld>
             <a:endParaRPr lang="en-US"/>
           </a:p>
@@ -2090,7 +2090,7 @@
           <p:cNvPr id="3" name="Footer Placeholder 2">
             <a:extLst>
               <a:ext uri="{FF2B5EF4-FFF2-40B4-BE49-F238E27FC236}">
-                <a16:creationId xmlns:a16="http://schemas.microsoft.com/office/drawing/2014/main" xmlns="" id="{115A8C34-4314-4A82-B3BB-030F199D5E14}"/>
+                <a16:creationId xmlns:a16="http://schemas.microsoft.com/office/drawing/2014/main" id="{115A8C34-4314-4A82-B3BB-030F199D5E14}"/>
               </a:ext>
             </a:extLst>
           </p:cNvPr>
@@ -2115,7 +2115,7 @@
           <p:cNvPr id="4" name="Slide Number Placeholder 3">
             <a:extLst>
               <a:ext uri="{FF2B5EF4-FFF2-40B4-BE49-F238E27FC236}">
-                <a16:creationId xmlns:a16="http://schemas.microsoft.com/office/drawing/2014/main" xmlns="" id="{A906DD28-C7A4-4D55-9D38-7081919EE538}"/>
+                <a16:creationId xmlns:a16="http://schemas.microsoft.com/office/drawing/2014/main" id="{A906DD28-C7A4-4D55-9D38-7081919EE538}"/>
               </a:ext>
             </a:extLst>
           </p:cNvPr>
@@ -2174,7 +2174,7 @@
           <p:cNvPr id="2" name="Title 1">
             <a:extLst>
               <a:ext uri="{FF2B5EF4-FFF2-40B4-BE49-F238E27FC236}">
-                <a16:creationId xmlns:a16="http://schemas.microsoft.com/office/drawing/2014/main" xmlns="" id="{62C354CB-54E2-432D-B6C8-A4A9EFF3265D}"/>
+                <a16:creationId xmlns:a16="http://schemas.microsoft.com/office/drawing/2014/main" id="{62C354CB-54E2-432D-B6C8-A4A9EFF3265D}"/>
               </a:ext>
             </a:extLst>
           </p:cNvPr>
@@ -2211,7 +2211,7 @@
           <p:cNvPr id="3" name="Content Placeholder 2">
             <a:extLst>
               <a:ext uri="{FF2B5EF4-FFF2-40B4-BE49-F238E27FC236}">
-                <a16:creationId xmlns:a16="http://schemas.microsoft.com/office/drawing/2014/main" xmlns="" id="{6A5A2B9B-5BE5-43F8-B875-C60D2C9D2BE6}"/>
+                <a16:creationId xmlns:a16="http://schemas.microsoft.com/office/drawing/2014/main" id="{6A5A2B9B-5BE5-43F8-B875-C60D2C9D2BE6}"/>
               </a:ext>
             </a:extLst>
           </p:cNvPr>
@@ -2301,7 +2301,7 @@
           <p:cNvPr id="4" name="Text Placeholder 3">
             <a:extLst>
               <a:ext uri="{FF2B5EF4-FFF2-40B4-BE49-F238E27FC236}">
-                <a16:creationId xmlns:a16="http://schemas.microsoft.com/office/drawing/2014/main" xmlns="" id="{7FA31FF7-B123-4C82-A779-863FF67CEAFF}"/>
+                <a16:creationId xmlns:a16="http://schemas.microsoft.com/office/drawing/2014/main" id="{7FA31FF7-B123-4C82-A779-863FF67CEAFF}"/>
               </a:ext>
             </a:extLst>
           </p:cNvPr>
@@ -2372,7 +2372,7 @@
           <p:cNvPr id="5" name="Date Placeholder 4">
             <a:extLst>
               <a:ext uri="{FF2B5EF4-FFF2-40B4-BE49-F238E27FC236}">
-                <a16:creationId xmlns:a16="http://schemas.microsoft.com/office/drawing/2014/main" xmlns="" id="{6A1890B2-4548-4AF5-8F3A-18D9D080F132}"/>
+                <a16:creationId xmlns:a16="http://schemas.microsoft.com/office/drawing/2014/main" id="{6A1890B2-4548-4AF5-8F3A-18D9D080F132}"/>
               </a:ext>
             </a:extLst>
           </p:cNvPr>
@@ -2390,7 +2390,7 @@
           <a:p>
             <a:fld id="{8EC706C8-D35E-4DF4-BED8-A06440662B0A}" type="datetimeFigureOut">
               <a:rPr lang="en-US" smtClean="0"/>
-              <a:t>18-Aug-18</a:t>
+              <a:t>19-Aug-18</a:t>
             </a:fld>
             <a:endParaRPr lang="en-US"/>
           </a:p>
@@ -2401,7 +2401,7 @@
           <p:cNvPr id="6" name="Footer Placeholder 5">
             <a:extLst>
               <a:ext uri="{FF2B5EF4-FFF2-40B4-BE49-F238E27FC236}">
-                <a16:creationId xmlns:a16="http://schemas.microsoft.com/office/drawing/2014/main" xmlns="" id="{12BBF8C9-8232-4ADF-B0EE-E3B5FEFB8A3C}"/>
+                <a16:creationId xmlns:a16="http://schemas.microsoft.com/office/drawing/2014/main" id="{12BBF8C9-8232-4ADF-B0EE-E3B5FEFB8A3C}"/>
               </a:ext>
             </a:extLst>
           </p:cNvPr>
@@ -2426,7 +2426,7 @@
           <p:cNvPr id="7" name="Slide Number Placeholder 6">
             <a:extLst>
               <a:ext uri="{FF2B5EF4-FFF2-40B4-BE49-F238E27FC236}">
-                <a16:creationId xmlns:a16="http://schemas.microsoft.com/office/drawing/2014/main" xmlns="" id="{B32D7EFE-4B2C-46C4-BB54-04EA41D89C30}"/>
+                <a16:creationId xmlns:a16="http://schemas.microsoft.com/office/drawing/2014/main" id="{B32D7EFE-4B2C-46C4-BB54-04EA41D89C30}"/>
               </a:ext>
             </a:extLst>
           </p:cNvPr>
@@ -2485,7 +2485,7 @@
           <p:cNvPr id="2" name="Title 1">
             <a:extLst>
               <a:ext uri="{FF2B5EF4-FFF2-40B4-BE49-F238E27FC236}">
-                <a16:creationId xmlns:a16="http://schemas.microsoft.com/office/drawing/2014/main" xmlns="" id="{25F5A5AF-36C5-4520-983A-8D76ED6637FB}"/>
+                <a16:creationId xmlns:a16="http://schemas.microsoft.com/office/drawing/2014/main" id="{25F5A5AF-36C5-4520-983A-8D76ED6637FB}"/>
               </a:ext>
             </a:extLst>
           </p:cNvPr>
@@ -2522,7 +2522,7 @@
           <p:cNvPr id="3" name="Picture Placeholder 2">
             <a:extLst>
               <a:ext uri="{FF2B5EF4-FFF2-40B4-BE49-F238E27FC236}">
-                <a16:creationId xmlns:a16="http://schemas.microsoft.com/office/drawing/2014/main" xmlns="" id="{88522411-141F-4C84-AD43-CC8A1212E57B}"/>
+                <a16:creationId xmlns:a16="http://schemas.microsoft.com/office/drawing/2014/main" id="{88522411-141F-4C84-AD43-CC8A1212E57B}"/>
               </a:ext>
             </a:extLst>
           </p:cNvPr>
@@ -2589,7 +2589,7 @@
           <p:cNvPr id="4" name="Text Placeholder 3">
             <a:extLst>
               <a:ext uri="{FF2B5EF4-FFF2-40B4-BE49-F238E27FC236}">
-                <a16:creationId xmlns:a16="http://schemas.microsoft.com/office/drawing/2014/main" xmlns="" id="{4E9FE970-FBD4-402A-982B-BDA3B96894FF}"/>
+                <a16:creationId xmlns:a16="http://schemas.microsoft.com/office/drawing/2014/main" id="{4E9FE970-FBD4-402A-982B-BDA3B96894FF}"/>
               </a:ext>
             </a:extLst>
           </p:cNvPr>
@@ -2660,7 +2660,7 @@
           <p:cNvPr id="5" name="Date Placeholder 4">
             <a:extLst>
               <a:ext uri="{FF2B5EF4-FFF2-40B4-BE49-F238E27FC236}">
-                <a16:creationId xmlns:a16="http://schemas.microsoft.com/office/drawing/2014/main" xmlns="" id="{63C1E6A4-6333-4ACA-8652-C3E9FD90BD23}"/>
+                <a16:creationId xmlns:a16="http://schemas.microsoft.com/office/drawing/2014/main" id="{63C1E6A4-6333-4ACA-8652-C3E9FD90BD23}"/>
               </a:ext>
             </a:extLst>
           </p:cNvPr>
@@ -2678,7 +2678,7 @@
           <a:p>
             <a:fld id="{8EC706C8-D35E-4DF4-BED8-A06440662B0A}" type="datetimeFigureOut">
               <a:rPr lang="en-US" smtClean="0"/>
-              <a:t>18-Aug-18</a:t>
+              <a:t>19-Aug-18</a:t>
             </a:fld>
             <a:endParaRPr lang="en-US"/>
           </a:p>
@@ -2689,7 +2689,7 @@
           <p:cNvPr id="6" name="Footer Placeholder 5">
             <a:extLst>
               <a:ext uri="{FF2B5EF4-FFF2-40B4-BE49-F238E27FC236}">
-                <a16:creationId xmlns:a16="http://schemas.microsoft.com/office/drawing/2014/main" xmlns="" id="{4637F631-0CAA-4C83-BC63-7B1B2F6EBD2C}"/>
+                <a16:creationId xmlns:a16="http://schemas.microsoft.com/office/drawing/2014/main" id="{4637F631-0CAA-4C83-BC63-7B1B2F6EBD2C}"/>
               </a:ext>
             </a:extLst>
           </p:cNvPr>
@@ -2714,7 +2714,7 @@
           <p:cNvPr id="7" name="Slide Number Placeholder 6">
             <a:extLst>
               <a:ext uri="{FF2B5EF4-FFF2-40B4-BE49-F238E27FC236}">
-                <a16:creationId xmlns:a16="http://schemas.microsoft.com/office/drawing/2014/main" xmlns="" id="{D0074317-0A1D-4B91-BFEA-D3DBBED29117}"/>
+                <a16:creationId xmlns:a16="http://schemas.microsoft.com/office/drawing/2014/main" id="{D0074317-0A1D-4B91-BFEA-D3DBBED29117}"/>
               </a:ext>
             </a:extLst>
           </p:cNvPr>
@@ -2778,7 +2778,7 @@
           <p:cNvPr id="2" name="Title Placeholder 1">
             <a:extLst>
               <a:ext uri="{FF2B5EF4-FFF2-40B4-BE49-F238E27FC236}">
-                <a16:creationId xmlns:a16="http://schemas.microsoft.com/office/drawing/2014/main" xmlns="" id="{9740C54C-8F50-4CA8-87CA-EA4CACDA35B7}"/>
+                <a16:creationId xmlns:a16="http://schemas.microsoft.com/office/drawing/2014/main" id="{9740C54C-8F50-4CA8-87CA-EA4CACDA35B7}"/>
               </a:ext>
             </a:extLst>
           </p:cNvPr>
@@ -2816,7 +2816,7 @@
           <p:cNvPr id="3" name="Text Placeholder 2">
             <a:extLst>
               <a:ext uri="{FF2B5EF4-FFF2-40B4-BE49-F238E27FC236}">
-                <a16:creationId xmlns:a16="http://schemas.microsoft.com/office/drawing/2014/main" xmlns="" id="{FB8BDC7F-4C99-4198-8E23-27399A5AFC96}"/>
+                <a16:creationId xmlns:a16="http://schemas.microsoft.com/office/drawing/2014/main" id="{FB8BDC7F-4C99-4198-8E23-27399A5AFC96}"/>
               </a:ext>
             </a:extLst>
           </p:cNvPr>
@@ -2883,7 +2883,7 @@
           <p:cNvPr id="4" name="Date Placeholder 3">
             <a:extLst>
               <a:ext uri="{FF2B5EF4-FFF2-40B4-BE49-F238E27FC236}">
-                <a16:creationId xmlns:a16="http://schemas.microsoft.com/office/drawing/2014/main" xmlns="" id="{5BBBAD95-C3A7-4429-84A9-60A98236D377}"/>
+                <a16:creationId xmlns:a16="http://schemas.microsoft.com/office/drawing/2014/main" id="{5BBBAD95-C3A7-4429-84A9-60A98236D377}"/>
               </a:ext>
             </a:extLst>
           </p:cNvPr>
@@ -2919,7 +2919,7 @@
           <a:p>
             <a:fld id="{8EC706C8-D35E-4DF4-BED8-A06440662B0A}" type="datetimeFigureOut">
               <a:rPr lang="en-US" smtClean="0"/>
-              <a:t>18-Aug-18</a:t>
+              <a:t>19-Aug-18</a:t>
             </a:fld>
             <a:endParaRPr lang="en-US"/>
           </a:p>
@@ -2930,7 +2930,7 @@
           <p:cNvPr id="5" name="Footer Placeholder 4">
             <a:extLst>
               <a:ext uri="{FF2B5EF4-FFF2-40B4-BE49-F238E27FC236}">
-                <a16:creationId xmlns:a16="http://schemas.microsoft.com/office/drawing/2014/main" xmlns="" id="{613E4A1C-D901-44D1-9230-25394D7524F7}"/>
+                <a16:creationId xmlns:a16="http://schemas.microsoft.com/office/drawing/2014/main" id="{613E4A1C-D901-44D1-9230-25394D7524F7}"/>
               </a:ext>
             </a:extLst>
           </p:cNvPr>
@@ -2973,7 +2973,7 @@
           <p:cNvPr id="6" name="Slide Number Placeholder 5">
             <a:extLst>
               <a:ext uri="{FF2B5EF4-FFF2-40B4-BE49-F238E27FC236}">
-                <a16:creationId xmlns:a16="http://schemas.microsoft.com/office/drawing/2014/main" xmlns="" id="{09E4134A-3983-4165-926B-F049522905AE}"/>
+                <a16:creationId xmlns:a16="http://schemas.microsoft.com/office/drawing/2014/main" id="{09E4134A-3983-4165-926B-F049522905AE}"/>
               </a:ext>
             </a:extLst>
           </p:cNvPr>
@@ -3341,7 +3341,7 @@
           <p:cNvPr id="2" name="Title 1">
             <a:extLst>
               <a:ext uri="{FF2B5EF4-FFF2-40B4-BE49-F238E27FC236}">
-                <a16:creationId xmlns:a16="http://schemas.microsoft.com/office/drawing/2014/main" xmlns="" id="{670EFDDE-64AD-4380-895F-EF64F490BA48}"/>
+                <a16:creationId xmlns:a16="http://schemas.microsoft.com/office/drawing/2014/main" id="{670EFDDE-64AD-4380-895F-EF64F490BA48}"/>
               </a:ext>
             </a:extLst>
           </p:cNvPr>
@@ -3369,7 +3369,7 @@
           <p:cNvPr id="3" name="Subtitle 2">
             <a:extLst>
               <a:ext uri="{FF2B5EF4-FFF2-40B4-BE49-F238E27FC236}">
-                <a16:creationId xmlns:a16="http://schemas.microsoft.com/office/drawing/2014/main" xmlns="" id="{DEB15BFE-689A-4C75-809C-A79695E04ED1}"/>
+                <a16:creationId xmlns:a16="http://schemas.microsoft.com/office/drawing/2014/main" id="{DEB15BFE-689A-4C75-809C-A79695E04ED1}"/>
               </a:ext>
             </a:extLst>
           </p:cNvPr>
@@ -3402,7 +3402,7 @@
           <p:cNvPr id="5" name="Picture 4">
             <a:extLst>
               <a:ext uri="{FF2B5EF4-FFF2-40B4-BE49-F238E27FC236}">
-                <a16:creationId xmlns:a16="http://schemas.microsoft.com/office/drawing/2014/main" xmlns="" id="{A3D0DFD0-E7BE-4A6B-8750-106FF063D887}"/>
+                <a16:creationId xmlns:a16="http://schemas.microsoft.com/office/drawing/2014/main" id="{A3D0DFD0-E7BE-4A6B-8750-106FF063D887}"/>
               </a:ext>
             </a:extLst>
           </p:cNvPr>
@@ -3468,7 +3468,7 @@
           <p:cNvPr id="2" name="Title 1">
             <a:extLst>
               <a:ext uri="{FF2B5EF4-FFF2-40B4-BE49-F238E27FC236}">
-                <a16:creationId xmlns:a16="http://schemas.microsoft.com/office/drawing/2014/main" xmlns="" id="{670EFDDE-64AD-4380-895F-EF64F490BA48}"/>
+                <a16:creationId xmlns:a16="http://schemas.microsoft.com/office/drawing/2014/main" id="{670EFDDE-64AD-4380-895F-EF64F490BA48}"/>
               </a:ext>
             </a:extLst>
           </p:cNvPr>
@@ -3503,7 +3503,7 @@
           <p:cNvPr id="5" name="Picture 4">
             <a:extLst>
               <a:ext uri="{FF2B5EF4-FFF2-40B4-BE49-F238E27FC236}">
-                <a16:creationId xmlns:a16="http://schemas.microsoft.com/office/drawing/2014/main" xmlns="" id="{A3D0DFD0-E7BE-4A6B-8750-106FF063D887}"/>
+                <a16:creationId xmlns:a16="http://schemas.microsoft.com/office/drawing/2014/main" id="{A3D0DFD0-E7BE-4A6B-8750-106FF063D887}"/>
               </a:ext>
             </a:extLst>
           </p:cNvPr>
@@ -3539,7 +3539,7 @@
           <p:cNvPr id="3" name="TextBox 2">
             <a:extLst>
               <a:ext uri="{FF2B5EF4-FFF2-40B4-BE49-F238E27FC236}">
-                <a16:creationId xmlns:a16="http://schemas.microsoft.com/office/drawing/2014/main" xmlns="" id="{4E84A00E-81D6-4BC1-9B69-CD6BE226E6D1}"/>
+                <a16:creationId xmlns:a16="http://schemas.microsoft.com/office/drawing/2014/main" id="{4E84A00E-81D6-4BC1-9B69-CD6BE226E6D1}"/>
               </a:ext>
             </a:extLst>
           </p:cNvPr>
@@ -3634,7 +3634,7 @@
           <p:cNvPr id="2" name="Title 1">
             <a:extLst>
               <a:ext uri="{FF2B5EF4-FFF2-40B4-BE49-F238E27FC236}">
-                <a16:creationId xmlns:a16="http://schemas.microsoft.com/office/drawing/2014/main" xmlns="" id="{670EFDDE-64AD-4380-895F-EF64F490BA48}"/>
+                <a16:creationId xmlns:a16="http://schemas.microsoft.com/office/drawing/2014/main" id="{670EFDDE-64AD-4380-895F-EF64F490BA48}"/>
               </a:ext>
             </a:extLst>
           </p:cNvPr>
@@ -3669,7 +3669,7 @@
           <p:cNvPr id="5" name="Picture 4">
             <a:extLst>
               <a:ext uri="{FF2B5EF4-FFF2-40B4-BE49-F238E27FC236}">
-                <a16:creationId xmlns:a16="http://schemas.microsoft.com/office/drawing/2014/main" xmlns="" id="{A3D0DFD0-E7BE-4A6B-8750-106FF063D887}"/>
+                <a16:creationId xmlns:a16="http://schemas.microsoft.com/office/drawing/2014/main" id="{A3D0DFD0-E7BE-4A6B-8750-106FF063D887}"/>
               </a:ext>
             </a:extLst>
           </p:cNvPr>
@@ -3705,7 +3705,7 @@
           <p:cNvPr id="6" name="TextBox 5">
             <a:extLst>
               <a:ext uri="{FF2B5EF4-FFF2-40B4-BE49-F238E27FC236}">
-                <a16:creationId xmlns:a16="http://schemas.microsoft.com/office/drawing/2014/main" xmlns="" id="{1D23874F-A954-4BB4-A682-7D77C11DD3B1}"/>
+                <a16:creationId xmlns:a16="http://schemas.microsoft.com/office/drawing/2014/main" id="{1D23874F-A954-4BB4-A682-7D77C11DD3B1}"/>
               </a:ext>
             </a:extLst>
           </p:cNvPr>
@@ -3913,7 +3913,7 @@
           <p:cNvPr id="2" name="Title 1">
             <a:extLst>
               <a:ext uri="{FF2B5EF4-FFF2-40B4-BE49-F238E27FC236}">
-                <a16:creationId xmlns:a16="http://schemas.microsoft.com/office/drawing/2014/main" xmlns="" id="{670EFDDE-64AD-4380-895F-EF64F490BA48}"/>
+                <a16:creationId xmlns:a16="http://schemas.microsoft.com/office/drawing/2014/main" id="{670EFDDE-64AD-4380-895F-EF64F490BA48}"/>
               </a:ext>
             </a:extLst>
           </p:cNvPr>
@@ -3949,7 +3949,7 @@
           <p:cNvPr id="5" name="Picture 4">
             <a:extLst>
               <a:ext uri="{FF2B5EF4-FFF2-40B4-BE49-F238E27FC236}">
-                <a16:creationId xmlns:a16="http://schemas.microsoft.com/office/drawing/2014/main" xmlns="" id="{A3D0DFD0-E7BE-4A6B-8750-106FF063D887}"/>
+                <a16:creationId xmlns:a16="http://schemas.microsoft.com/office/drawing/2014/main" id="{A3D0DFD0-E7BE-4A6B-8750-106FF063D887}"/>
               </a:ext>
             </a:extLst>
           </p:cNvPr>
@@ -3985,7 +3985,7 @@
           <p:cNvPr id="7" name="Oval 6">
             <a:extLst>
               <a:ext uri="{FF2B5EF4-FFF2-40B4-BE49-F238E27FC236}">
-                <a16:creationId xmlns:a16="http://schemas.microsoft.com/office/drawing/2014/main" xmlns="" id="{5C8117C1-A9EF-4434-A321-554895EEA56F}"/>
+                <a16:creationId xmlns:a16="http://schemas.microsoft.com/office/drawing/2014/main" id="{5C8117C1-A9EF-4434-A321-554895EEA56F}"/>
               </a:ext>
             </a:extLst>
           </p:cNvPr>
@@ -4062,7 +4062,7 @@
           <p:cNvPr id="8" name="Oval 7">
             <a:extLst>
               <a:ext uri="{FF2B5EF4-FFF2-40B4-BE49-F238E27FC236}">
-                <a16:creationId xmlns:a16="http://schemas.microsoft.com/office/drawing/2014/main" xmlns="" id="{A1D43285-D314-4A0C-A362-E2393157ABF1}"/>
+                <a16:creationId xmlns:a16="http://schemas.microsoft.com/office/drawing/2014/main" id="{A1D43285-D314-4A0C-A362-E2393157ABF1}"/>
               </a:ext>
             </a:extLst>
           </p:cNvPr>
@@ -4145,7 +4145,7 @@
           <p:cNvPr id="9" name="Rectangle 8">
             <a:extLst>
               <a:ext uri="{FF2B5EF4-FFF2-40B4-BE49-F238E27FC236}">
-                <a16:creationId xmlns:a16="http://schemas.microsoft.com/office/drawing/2014/main" xmlns="" id="{226B26EE-1A19-4C84-BFFB-1B6B77F5CA0B}"/>
+                <a16:creationId xmlns:a16="http://schemas.microsoft.com/office/drawing/2014/main" id="{226B26EE-1A19-4C84-BFFB-1B6B77F5CA0B}"/>
               </a:ext>
             </a:extLst>
           </p:cNvPr>
@@ -4194,7 +4194,7 @@
           <p:cNvPr id="11" name="Oval 10">
             <a:extLst>
               <a:ext uri="{FF2B5EF4-FFF2-40B4-BE49-F238E27FC236}">
-                <a16:creationId xmlns:a16="http://schemas.microsoft.com/office/drawing/2014/main" xmlns="" id="{D30AE2F5-286B-443B-A63F-FDDF995EFC77}"/>
+                <a16:creationId xmlns:a16="http://schemas.microsoft.com/office/drawing/2014/main" id="{D30AE2F5-286B-443B-A63F-FDDF995EFC77}"/>
               </a:ext>
             </a:extLst>
           </p:cNvPr>
@@ -4258,7 +4258,7 @@
           <p:cNvPr id="12" name="Oval 11">
             <a:extLst>
               <a:ext uri="{FF2B5EF4-FFF2-40B4-BE49-F238E27FC236}">
-                <a16:creationId xmlns:a16="http://schemas.microsoft.com/office/drawing/2014/main" xmlns="" id="{D78837A2-9A35-4B29-B8A1-73FDE47721F5}"/>
+                <a16:creationId xmlns:a16="http://schemas.microsoft.com/office/drawing/2014/main" id="{D78837A2-9A35-4B29-B8A1-73FDE47721F5}"/>
               </a:ext>
             </a:extLst>
           </p:cNvPr>
@@ -4322,7 +4322,7 @@
           <p:cNvPr id="13" name="Oval 12">
             <a:extLst>
               <a:ext uri="{FF2B5EF4-FFF2-40B4-BE49-F238E27FC236}">
-                <a16:creationId xmlns:a16="http://schemas.microsoft.com/office/drawing/2014/main" xmlns="" id="{BD6323BD-538F-4583-856B-9D934A2CBC89}"/>
+                <a16:creationId xmlns:a16="http://schemas.microsoft.com/office/drawing/2014/main" id="{BD6323BD-538F-4583-856B-9D934A2CBC89}"/>
               </a:ext>
             </a:extLst>
           </p:cNvPr>
@@ -4386,7 +4386,7 @@
           <p:cNvPr id="14" name="Oval 13">
             <a:extLst>
               <a:ext uri="{FF2B5EF4-FFF2-40B4-BE49-F238E27FC236}">
-                <a16:creationId xmlns:a16="http://schemas.microsoft.com/office/drawing/2014/main" xmlns="" id="{BEEC136A-3698-4511-8E0E-52D2218A2008}"/>
+                <a16:creationId xmlns:a16="http://schemas.microsoft.com/office/drawing/2014/main" id="{BEEC136A-3698-4511-8E0E-52D2218A2008}"/>
               </a:ext>
             </a:extLst>
           </p:cNvPr>
@@ -4450,7 +4450,7 @@
           <p:cNvPr id="15" name="Rectangle 14">
             <a:extLst>
               <a:ext uri="{FF2B5EF4-FFF2-40B4-BE49-F238E27FC236}">
-                <a16:creationId xmlns:a16="http://schemas.microsoft.com/office/drawing/2014/main" xmlns="" id="{66BA1CB5-C4E9-4C3C-9D1B-F13743A2398D}"/>
+                <a16:creationId xmlns:a16="http://schemas.microsoft.com/office/drawing/2014/main" id="{66BA1CB5-C4E9-4C3C-9D1B-F13743A2398D}"/>
               </a:ext>
             </a:extLst>
           </p:cNvPr>
@@ -4499,7 +4499,7 @@
           <p:cNvPr id="16" name="Rectangle 15">
             <a:extLst>
               <a:ext uri="{FF2B5EF4-FFF2-40B4-BE49-F238E27FC236}">
-                <a16:creationId xmlns:a16="http://schemas.microsoft.com/office/drawing/2014/main" xmlns="" id="{A3956D54-AD37-4189-A354-C1F0ED3B3909}"/>
+                <a16:creationId xmlns:a16="http://schemas.microsoft.com/office/drawing/2014/main" id="{A3956D54-AD37-4189-A354-C1F0ED3B3909}"/>
               </a:ext>
             </a:extLst>
           </p:cNvPr>
@@ -4548,7 +4548,7 @@
           <p:cNvPr id="17" name="Oval 16">
             <a:extLst>
               <a:ext uri="{FF2B5EF4-FFF2-40B4-BE49-F238E27FC236}">
-                <a16:creationId xmlns:a16="http://schemas.microsoft.com/office/drawing/2014/main" xmlns="" id="{71B83329-655A-46E0-94A5-E3328A1D7C86}"/>
+                <a16:creationId xmlns:a16="http://schemas.microsoft.com/office/drawing/2014/main" id="{71B83329-655A-46E0-94A5-E3328A1D7C86}"/>
               </a:ext>
             </a:extLst>
           </p:cNvPr>
@@ -4612,7 +4612,7 @@
           <p:cNvPr id="19" name="Straight Arrow Connector 18">
             <a:extLst>
               <a:ext uri="{FF2B5EF4-FFF2-40B4-BE49-F238E27FC236}">
-                <a16:creationId xmlns:a16="http://schemas.microsoft.com/office/drawing/2014/main" xmlns="" id="{740775EA-CECB-468C-BBE4-7E75E5969E32}"/>
+                <a16:creationId xmlns:a16="http://schemas.microsoft.com/office/drawing/2014/main" id="{740775EA-CECB-468C-BBE4-7E75E5969E32}"/>
               </a:ext>
             </a:extLst>
           </p:cNvPr>
@@ -4654,7 +4654,7 @@
           <p:cNvPr id="20" name="Straight Arrow Connector 19">
             <a:extLst>
               <a:ext uri="{FF2B5EF4-FFF2-40B4-BE49-F238E27FC236}">
-                <a16:creationId xmlns:a16="http://schemas.microsoft.com/office/drawing/2014/main" xmlns="" id="{7B23A080-20AE-4EA5-92D5-E633E4B2A9DD}"/>
+                <a16:creationId xmlns:a16="http://schemas.microsoft.com/office/drawing/2014/main" id="{7B23A080-20AE-4EA5-92D5-E633E4B2A9DD}"/>
               </a:ext>
             </a:extLst>
           </p:cNvPr>
@@ -4696,7 +4696,7 @@
           <p:cNvPr id="22" name="Straight Arrow Connector 21">
             <a:extLst>
               <a:ext uri="{FF2B5EF4-FFF2-40B4-BE49-F238E27FC236}">
-                <a16:creationId xmlns:a16="http://schemas.microsoft.com/office/drawing/2014/main" xmlns="" id="{C9A6804D-CEEE-4F24-B9F1-C6B953494A67}"/>
+                <a16:creationId xmlns:a16="http://schemas.microsoft.com/office/drawing/2014/main" id="{C9A6804D-CEEE-4F24-B9F1-C6B953494A67}"/>
               </a:ext>
             </a:extLst>
           </p:cNvPr>
@@ -4737,7 +4737,7 @@
           <p:cNvPr id="23" name="Straight Arrow Connector 22">
             <a:extLst>
               <a:ext uri="{FF2B5EF4-FFF2-40B4-BE49-F238E27FC236}">
-                <a16:creationId xmlns:a16="http://schemas.microsoft.com/office/drawing/2014/main" xmlns="" id="{7D53CF95-C3A5-4ABC-BF90-CCA1618FD2BB}"/>
+                <a16:creationId xmlns:a16="http://schemas.microsoft.com/office/drawing/2014/main" id="{7D53CF95-C3A5-4ABC-BF90-CCA1618FD2BB}"/>
               </a:ext>
             </a:extLst>
           </p:cNvPr>
@@ -4778,7 +4778,7 @@
           <p:cNvPr id="24" name="Straight Arrow Connector 23">
             <a:extLst>
               <a:ext uri="{FF2B5EF4-FFF2-40B4-BE49-F238E27FC236}">
-                <a16:creationId xmlns:a16="http://schemas.microsoft.com/office/drawing/2014/main" xmlns="" id="{1BDB8BF7-B09C-4D87-B71E-7FD7D5254828}"/>
+                <a16:creationId xmlns:a16="http://schemas.microsoft.com/office/drawing/2014/main" id="{1BDB8BF7-B09C-4D87-B71E-7FD7D5254828}"/>
               </a:ext>
             </a:extLst>
           </p:cNvPr>
@@ -4820,7 +4820,7 @@
           <p:cNvPr id="26" name="Straight Arrow Connector 25">
             <a:extLst>
               <a:ext uri="{FF2B5EF4-FFF2-40B4-BE49-F238E27FC236}">
-                <a16:creationId xmlns:a16="http://schemas.microsoft.com/office/drawing/2014/main" xmlns="" id="{F97CB1A5-A42F-4FCE-8C80-1FC8DF604253}"/>
+                <a16:creationId xmlns:a16="http://schemas.microsoft.com/office/drawing/2014/main" id="{F97CB1A5-A42F-4FCE-8C80-1FC8DF604253}"/>
               </a:ext>
             </a:extLst>
           </p:cNvPr>
@@ -4862,7 +4862,7 @@
           <p:cNvPr id="27" name="Straight Arrow Connector 26">
             <a:extLst>
               <a:ext uri="{FF2B5EF4-FFF2-40B4-BE49-F238E27FC236}">
-                <a16:creationId xmlns:a16="http://schemas.microsoft.com/office/drawing/2014/main" xmlns="" id="{58F68B7E-3F2E-454A-88B5-B1C208CEFF7C}"/>
+                <a16:creationId xmlns:a16="http://schemas.microsoft.com/office/drawing/2014/main" id="{58F68B7E-3F2E-454A-88B5-B1C208CEFF7C}"/>
               </a:ext>
             </a:extLst>
           </p:cNvPr>
@@ -4904,7 +4904,7 @@
           <p:cNvPr id="28" name="Straight Arrow Connector 27">
             <a:extLst>
               <a:ext uri="{FF2B5EF4-FFF2-40B4-BE49-F238E27FC236}">
-                <a16:creationId xmlns:a16="http://schemas.microsoft.com/office/drawing/2014/main" xmlns="" id="{1E79242F-4FB5-403B-B985-B31487AC7950}"/>
+                <a16:creationId xmlns:a16="http://schemas.microsoft.com/office/drawing/2014/main" id="{1E79242F-4FB5-403B-B985-B31487AC7950}"/>
               </a:ext>
             </a:extLst>
           </p:cNvPr>
@@ -4945,7 +4945,7 @@
           <p:cNvPr id="38" name="Straight Arrow Connector 37">
             <a:extLst>
               <a:ext uri="{FF2B5EF4-FFF2-40B4-BE49-F238E27FC236}">
-                <a16:creationId xmlns:a16="http://schemas.microsoft.com/office/drawing/2014/main" xmlns="" id="{2F823D16-5D45-4689-A8AD-FE131487164D}"/>
+                <a16:creationId xmlns:a16="http://schemas.microsoft.com/office/drawing/2014/main" id="{2F823D16-5D45-4689-A8AD-FE131487164D}"/>
               </a:ext>
             </a:extLst>
           </p:cNvPr>
@@ -4987,7 +4987,7 @@
           <p:cNvPr id="40" name="Straight Arrow Connector 39">
             <a:extLst>
               <a:ext uri="{FF2B5EF4-FFF2-40B4-BE49-F238E27FC236}">
-                <a16:creationId xmlns:a16="http://schemas.microsoft.com/office/drawing/2014/main" xmlns="" id="{6AF52FF7-ABB5-483D-A397-2FDA6AFA25B8}"/>
+                <a16:creationId xmlns:a16="http://schemas.microsoft.com/office/drawing/2014/main" id="{6AF52FF7-ABB5-483D-A397-2FDA6AFA25B8}"/>
               </a:ext>
             </a:extLst>
           </p:cNvPr>
@@ -5029,7 +5029,7 @@
           <p:cNvPr id="42" name="Straight Arrow Connector 41">
             <a:extLst>
               <a:ext uri="{FF2B5EF4-FFF2-40B4-BE49-F238E27FC236}">
-                <a16:creationId xmlns:a16="http://schemas.microsoft.com/office/drawing/2014/main" xmlns="" id="{F7B57B32-E68E-42A1-AC9F-BEA091C6AF47}"/>
+                <a16:creationId xmlns:a16="http://schemas.microsoft.com/office/drawing/2014/main" id="{F7B57B32-E68E-42A1-AC9F-BEA091C6AF47}"/>
               </a:ext>
             </a:extLst>
           </p:cNvPr>
@@ -5101,7 +5101,7 @@
           <p:cNvPr id="2" name="Title 1">
             <a:extLst>
               <a:ext uri="{FF2B5EF4-FFF2-40B4-BE49-F238E27FC236}">
-                <a16:creationId xmlns:a16="http://schemas.microsoft.com/office/drawing/2014/main" xmlns="" id="{670EFDDE-64AD-4380-895F-EF64F490BA48}"/>
+                <a16:creationId xmlns:a16="http://schemas.microsoft.com/office/drawing/2014/main" id="{670EFDDE-64AD-4380-895F-EF64F490BA48}"/>
               </a:ext>
             </a:extLst>
           </p:cNvPr>
@@ -5137,7 +5137,7 @@
           <p:cNvPr id="5" name="Picture 4">
             <a:extLst>
               <a:ext uri="{FF2B5EF4-FFF2-40B4-BE49-F238E27FC236}">
-                <a16:creationId xmlns:a16="http://schemas.microsoft.com/office/drawing/2014/main" xmlns="" id="{A3D0DFD0-E7BE-4A6B-8750-106FF063D887}"/>
+                <a16:creationId xmlns:a16="http://schemas.microsoft.com/office/drawing/2014/main" id="{A3D0DFD0-E7BE-4A6B-8750-106FF063D887}"/>
               </a:ext>
             </a:extLst>
           </p:cNvPr>
@@ -5173,7 +5173,7 @@
           <p:cNvPr id="56" name="TextBox 55">
             <a:extLst>
               <a:ext uri="{FF2B5EF4-FFF2-40B4-BE49-F238E27FC236}">
-                <a16:creationId xmlns:a16="http://schemas.microsoft.com/office/drawing/2014/main" xmlns="" id="{C870122C-4FA1-4479-AAE2-FCB129A84103}"/>
+                <a16:creationId xmlns:a16="http://schemas.microsoft.com/office/drawing/2014/main" id="{C870122C-4FA1-4479-AAE2-FCB129A84103}"/>
               </a:ext>
             </a:extLst>
           </p:cNvPr>
@@ -5284,7 +5284,7 @@
           <p:cNvPr id="57" name="TextBox 56">
             <a:extLst>
               <a:ext uri="{FF2B5EF4-FFF2-40B4-BE49-F238E27FC236}">
-                <a16:creationId xmlns:a16="http://schemas.microsoft.com/office/drawing/2014/main" xmlns="" id="{D75520CE-E29D-4347-8406-2C3FC6820C00}"/>
+                <a16:creationId xmlns:a16="http://schemas.microsoft.com/office/drawing/2014/main" id="{D75520CE-E29D-4347-8406-2C3FC6820C00}"/>
               </a:ext>
             </a:extLst>
           </p:cNvPr>
@@ -5330,7 +5330,7 @@
           <p:cNvPr id="58" name="TextBox 57">
             <a:extLst>
               <a:ext uri="{FF2B5EF4-FFF2-40B4-BE49-F238E27FC236}">
-                <a16:creationId xmlns:a16="http://schemas.microsoft.com/office/drawing/2014/main" xmlns="" id="{DDEE1961-DD4E-42B1-9E94-047B336D2A9F}"/>
+                <a16:creationId xmlns:a16="http://schemas.microsoft.com/office/drawing/2014/main" id="{DDEE1961-DD4E-42B1-9E94-047B336D2A9F}"/>
               </a:ext>
             </a:extLst>
           </p:cNvPr>
@@ -5396,7 +5396,7 @@
           <p:cNvPr id="60" name="Straight Arrow Connector 59">
             <a:extLst>
               <a:ext uri="{FF2B5EF4-FFF2-40B4-BE49-F238E27FC236}">
-                <a16:creationId xmlns:a16="http://schemas.microsoft.com/office/drawing/2014/main" xmlns="" id="{8422057F-9587-457E-B784-047A8DF36494}"/>
+                <a16:creationId xmlns:a16="http://schemas.microsoft.com/office/drawing/2014/main" id="{8422057F-9587-457E-B784-047A8DF36494}"/>
               </a:ext>
             </a:extLst>
           </p:cNvPr>
@@ -5439,7 +5439,7 @@
           <p:cNvPr id="62" name="Straight Arrow Connector 61">
             <a:extLst>
               <a:ext uri="{FF2B5EF4-FFF2-40B4-BE49-F238E27FC236}">
-                <a16:creationId xmlns:a16="http://schemas.microsoft.com/office/drawing/2014/main" xmlns="" id="{3343C429-5636-431D-8299-82A81F6D6292}"/>
+                <a16:creationId xmlns:a16="http://schemas.microsoft.com/office/drawing/2014/main" id="{3343C429-5636-431D-8299-82A81F6D6292}"/>
               </a:ext>
             </a:extLst>
           </p:cNvPr>
@@ -5512,7 +5512,7 @@
           <p:cNvPr id="2" name="Title 1">
             <a:extLst>
               <a:ext uri="{FF2B5EF4-FFF2-40B4-BE49-F238E27FC236}">
-                <a16:creationId xmlns:a16="http://schemas.microsoft.com/office/drawing/2014/main" xmlns="" id="{670EFDDE-64AD-4380-895F-EF64F490BA48}"/>
+                <a16:creationId xmlns:a16="http://schemas.microsoft.com/office/drawing/2014/main" id="{670EFDDE-64AD-4380-895F-EF64F490BA48}"/>
               </a:ext>
             </a:extLst>
           </p:cNvPr>
@@ -5551,7 +5551,7 @@
           <p:cNvPr id="5" name="Picture 4">
             <a:extLst>
               <a:ext uri="{FF2B5EF4-FFF2-40B4-BE49-F238E27FC236}">
-                <a16:creationId xmlns:a16="http://schemas.microsoft.com/office/drawing/2014/main" xmlns="" id="{A3D0DFD0-E7BE-4A6B-8750-106FF063D887}"/>
+                <a16:creationId xmlns:a16="http://schemas.microsoft.com/office/drawing/2014/main" id="{A3D0DFD0-E7BE-4A6B-8750-106FF063D887}"/>
               </a:ext>
             </a:extLst>
           </p:cNvPr>
@@ -5587,7 +5587,7 @@
           <p:cNvPr id="3" name="TextBox 2">
             <a:extLst>
               <a:ext uri="{FF2B5EF4-FFF2-40B4-BE49-F238E27FC236}">
-                <a16:creationId xmlns:a16="http://schemas.microsoft.com/office/drawing/2014/main" xmlns="" id="{4E876A50-2C7C-4ED4-9AC6-C378AFC33131}"/>
+                <a16:creationId xmlns:a16="http://schemas.microsoft.com/office/drawing/2014/main" id="{4E876A50-2C7C-4ED4-9AC6-C378AFC33131}"/>
               </a:ext>
             </a:extLst>
           </p:cNvPr>
@@ -5630,7 +5630,7 @@
           <p:cNvPr id="4" name="Table 3">
             <a:extLst>
               <a:ext uri="{FF2B5EF4-FFF2-40B4-BE49-F238E27FC236}">
-                <a16:creationId xmlns:a16="http://schemas.microsoft.com/office/drawing/2014/main" xmlns="" id="{A0A2FB27-FA87-47ED-838C-4AC666383E3A}"/>
+                <a16:creationId xmlns:a16="http://schemas.microsoft.com/office/drawing/2014/main" id="{A0A2FB27-FA87-47ED-838C-4AC666383E3A}"/>
               </a:ext>
             </a:extLst>
           </p:cNvPr>
@@ -5659,35 +5659,35 @@
                 <a:gridCol w="2197916">
                   <a:extLst>
                     <a:ext uri="{9D8B030D-6E8A-4147-A177-3AD203B41FA5}">
-                      <a16:colId xmlns:a16="http://schemas.microsoft.com/office/drawing/2014/main" xmlns="" val="1260642711"/>
+                      <a16:colId xmlns:a16="http://schemas.microsoft.com/office/drawing/2014/main" val="1260642711"/>
                     </a:ext>
                   </a:extLst>
                 </a:gridCol>
                 <a:gridCol w="2197916">
                   <a:extLst>
                     <a:ext uri="{9D8B030D-6E8A-4147-A177-3AD203B41FA5}">
-                      <a16:colId xmlns:a16="http://schemas.microsoft.com/office/drawing/2014/main" xmlns="" val="3268955320"/>
+                      <a16:colId xmlns:a16="http://schemas.microsoft.com/office/drawing/2014/main" val="3268955320"/>
                     </a:ext>
                   </a:extLst>
                 </a:gridCol>
                 <a:gridCol w="2197916">
                   <a:extLst>
                     <a:ext uri="{9D8B030D-6E8A-4147-A177-3AD203B41FA5}">
-                      <a16:colId xmlns:a16="http://schemas.microsoft.com/office/drawing/2014/main" xmlns="" val="1033781933"/>
+                      <a16:colId xmlns:a16="http://schemas.microsoft.com/office/drawing/2014/main" val="1033781933"/>
                     </a:ext>
                   </a:extLst>
                 </a:gridCol>
                 <a:gridCol w="2197916">
                   <a:extLst>
                     <a:ext uri="{9D8B030D-6E8A-4147-A177-3AD203B41FA5}">
-                      <a16:colId xmlns:a16="http://schemas.microsoft.com/office/drawing/2014/main" xmlns="" val="54004528"/>
+                      <a16:colId xmlns:a16="http://schemas.microsoft.com/office/drawing/2014/main" val="54004528"/>
                     </a:ext>
                   </a:extLst>
                 </a:gridCol>
                 <a:gridCol w="2197916">
                   <a:extLst>
                     <a:ext uri="{9D8B030D-6E8A-4147-A177-3AD203B41FA5}">
-                      <a16:colId xmlns:a16="http://schemas.microsoft.com/office/drawing/2014/main" xmlns="" val="4121656081"/>
+                      <a16:colId xmlns:a16="http://schemas.microsoft.com/office/drawing/2014/main" val="4121656081"/>
                     </a:ext>
                   </a:extLst>
                 </a:gridCol>
@@ -5760,7 +5760,7 @@
                 </a:tc>
                 <a:extLst>
                   <a:ext uri="{0D108BD9-81ED-4DB2-BD59-A6C34878D82A}">
-                    <a16:rowId xmlns:a16="http://schemas.microsoft.com/office/drawing/2014/main" xmlns="" val="4216933777"/>
+                    <a16:rowId xmlns:a16="http://schemas.microsoft.com/office/drawing/2014/main" val="4216933777"/>
                   </a:ext>
                 </a:extLst>
               </a:tr>
@@ -5833,7 +5833,7 @@
                 </a:tc>
                 <a:extLst>
                   <a:ext uri="{0D108BD9-81ED-4DB2-BD59-A6C34878D82A}">
-                    <a16:rowId xmlns:a16="http://schemas.microsoft.com/office/drawing/2014/main" xmlns="" val="793376613"/>
+                    <a16:rowId xmlns:a16="http://schemas.microsoft.com/office/drawing/2014/main" val="793376613"/>
                   </a:ext>
                 </a:extLst>
               </a:tr>
@@ -5906,7 +5906,7 @@
                 </a:tc>
                 <a:extLst>
                   <a:ext uri="{0D108BD9-81ED-4DB2-BD59-A6C34878D82A}">
-                    <a16:rowId xmlns:a16="http://schemas.microsoft.com/office/drawing/2014/main" xmlns="" val="3043844639"/>
+                    <a16:rowId xmlns:a16="http://schemas.microsoft.com/office/drawing/2014/main" val="3043844639"/>
                   </a:ext>
                 </a:extLst>
               </a:tr>
@@ -6000,7 +6000,7 @@
                 </a:tc>
                 <a:extLst>
                   <a:ext uri="{0D108BD9-81ED-4DB2-BD59-A6C34878D82A}">
-                    <a16:rowId xmlns:a16="http://schemas.microsoft.com/office/drawing/2014/main" xmlns="" val="58641842"/>
+                    <a16:rowId xmlns:a16="http://schemas.microsoft.com/office/drawing/2014/main" val="58641842"/>
                   </a:ext>
                 </a:extLst>
               </a:tr>
@@ -6086,7 +6086,7 @@
                 </a:tc>
                 <a:extLst>
                   <a:ext uri="{0D108BD9-81ED-4DB2-BD59-A6C34878D82A}">
-                    <a16:rowId xmlns:a16="http://schemas.microsoft.com/office/drawing/2014/main" xmlns="" val="977593107"/>
+                    <a16:rowId xmlns:a16="http://schemas.microsoft.com/office/drawing/2014/main" val="977593107"/>
                   </a:ext>
                 </a:extLst>
               </a:tr>
@@ -6143,7 +6143,7 @@
                 </a:tc>
                 <a:extLst>
                   <a:ext uri="{0D108BD9-81ED-4DB2-BD59-A6C34878D82A}">
-                    <a16:rowId xmlns:a16="http://schemas.microsoft.com/office/drawing/2014/main" xmlns="" val="3503811886"/>
+                    <a16:rowId xmlns:a16="http://schemas.microsoft.com/office/drawing/2014/main" val="3503811886"/>
                   </a:ext>
                 </a:extLst>
               </a:tr>
@@ -6200,7 +6200,7 @@
                 </a:tc>
                 <a:extLst>
                   <a:ext uri="{0D108BD9-81ED-4DB2-BD59-A6C34878D82A}">
-                    <a16:rowId xmlns:a16="http://schemas.microsoft.com/office/drawing/2014/main" xmlns="" val="1302831282"/>
+                    <a16:rowId xmlns:a16="http://schemas.microsoft.com/office/drawing/2014/main" val="1302831282"/>
                   </a:ext>
                 </a:extLst>
               </a:tr>
@@ -6257,7 +6257,7 @@
                 </a:tc>
                 <a:extLst>
                   <a:ext uri="{0D108BD9-81ED-4DB2-BD59-A6C34878D82A}">
-                    <a16:rowId xmlns:a16="http://schemas.microsoft.com/office/drawing/2014/main" xmlns="" val="2565133041"/>
+                    <a16:rowId xmlns:a16="http://schemas.microsoft.com/office/drawing/2014/main" val="2565133041"/>
                   </a:ext>
                 </a:extLst>
               </a:tr>
@@ -6300,7 +6300,7 @@
           <p:cNvPr id="2" name="Title 1">
             <a:extLst>
               <a:ext uri="{FF2B5EF4-FFF2-40B4-BE49-F238E27FC236}">
-                <a16:creationId xmlns:a16="http://schemas.microsoft.com/office/drawing/2014/main" xmlns="" id="{670EFDDE-64AD-4380-895F-EF64F490BA48}"/>
+                <a16:creationId xmlns:a16="http://schemas.microsoft.com/office/drawing/2014/main" id="{670EFDDE-64AD-4380-895F-EF64F490BA48}"/>
               </a:ext>
             </a:extLst>
           </p:cNvPr>
@@ -6336,7 +6336,7 @@
           <p:cNvPr id="5" name="Picture 4">
             <a:extLst>
               <a:ext uri="{FF2B5EF4-FFF2-40B4-BE49-F238E27FC236}">
-                <a16:creationId xmlns:a16="http://schemas.microsoft.com/office/drawing/2014/main" xmlns="" id="{A3D0DFD0-E7BE-4A6B-8750-106FF063D887}"/>
+                <a16:creationId xmlns:a16="http://schemas.microsoft.com/office/drawing/2014/main" id="{A3D0DFD0-E7BE-4A6B-8750-106FF063D887}"/>
               </a:ext>
             </a:extLst>
           </p:cNvPr>
@@ -6372,7 +6372,7 @@
           <p:cNvPr id="4" name="Table 3">
             <a:extLst>
               <a:ext uri="{FF2B5EF4-FFF2-40B4-BE49-F238E27FC236}">
-                <a16:creationId xmlns:a16="http://schemas.microsoft.com/office/drawing/2014/main" xmlns="" id="{A0A2FB27-FA87-47ED-838C-4AC666383E3A}"/>
+                <a16:creationId xmlns:a16="http://schemas.microsoft.com/office/drawing/2014/main" id="{A0A2FB27-FA87-47ED-838C-4AC666383E3A}"/>
               </a:ext>
             </a:extLst>
           </p:cNvPr>
@@ -6401,14 +6401,14 @@
                 <a:gridCol w="3223658">
                   <a:extLst>
                     <a:ext uri="{9D8B030D-6E8A-4147-A177-3AD203B41FA5}">
-                      <a16:colId xmlns:a16="http://schemas.microsoft.com/office/drawing/2014/main" xmlns="" val="1260642711"/>
+                      <a16:colId xmlns:a16="http://schemas.microsoft.com/office/drawing/2014/main" val="1260642711"/>
                     </a:ext>
                   </a:extLst>
                 </a:gridCol>
                 <a:gridCol w="7480695">
                   <a:extLst>
                     <a:ext uri="{9D8B030D-6E8A-4147-A177-3AD203B41FA5}">
-                      <a16:colId xmlns:a16="http://schemas.microsoft.com/office/drawing/2014/main" xmlns="" val="3268955320"/>
+                      <a16:colId xmlns:a16="http://schemas.microsoft.com/office/drawing/2014/main" val="3268955320"/>
                     </a:ext>
                   </a:extLst>
                 </a:gridCol>
@@ -6442,7 +6442,7 @@
                 </a:tc>
                 <a:extLst>
                   <a:ext uri="{0D108BD9-81ED-4DB2-BD59-A6C34878D82A}">
-                    <a16:rowId xmlns:a16="http://schemas.microsoft.com/office/drawing/2014/main" xmlns="" val="4216933777"/>
+                    <a16:rowId xmlns:a16="http://schemas.microsoft.com/office/drawing/2014/main" val="4216933777"/>
                   </a:ext>
                 </a:extLst>
               </a:tr>
@@ -6475,7 +6475,7 @@
                 </a:tc>
                 <a:extLst>
                   <a:ext uri="{0D108BD9-81ED-4DB2-BD59-A6C34878D82A}">
-                    <a16:rowId xmlns:a16="http://schemas.microsoft.com/office/drawing/2014/main" xmlns="" val="793376613"/>
+                    <a16:rowId xmlns:a16="http://schemas.microsoft.com/office/drawing/2014/main" val="793376613"/>
                   </a:ext>
                 </a:extLst>
               </a:tr>
@@ -6532,7 +6532,7 @@
                 </a:tc>
                 <a:extLst>
                   <a:ext uri="{0D108BD9-81ED-4DB2-BD59-A6C34878D82A}">
-                    <a16:rowId xmlns:a16="http://schemas.microsoft.com/office/drawing/2014/main" xmlns="" val="3043844639"/>
+                    <a16:rowId xmlns:a16="http://schemas.microsoft.com/office/drawing/2014/main" val="3043844639"/>
                   </a:ext>
                 </a:extLst>
               </a:tr>
@@ -6565,7 +6565,7 @@
                 </a:tc>
                 <a:extLst>
                   <a:ext uri="{0D108BD9-81ED-4DB2-BD59-A6C34878D82A}">
-                    <a16:rowId xmlns:a16="http://schemas.microsoft.com/office/drawing/2014/main" xmlns="" val="58641842"/>
+                    <a16:rowId xmlns:a16="http://schemas.microsoft.com/office/drawing/2014/main" val="58641842"/>
                   </a:ext>
                 </a:extLst>
               </a:tr>
@@ -6598,7 +6598,7 @@
                 </a:tc>
                 <a:extLst>
                   <a:ext uri="{0D108BD9-81ED-4DB2-BD59-A6C34878D82A}">
-                    <a16:rowId xmlns:a16="http://schemas.microsoft.com/office/drawing/2014/main" xmlns="" val="977593107"/>
+                    <a16:rowId xmlns:a16="http://schemas.microsoft.com/office/drawing/2014/main" val="977593107"/>
                   </a:ext>
                 </a:extLst>
               </a:tr>
@@ -6631,7 +6631,7 @@
                 </a:tc>
                 <a:extLst>
                   <a:ext uri="{0D108BD9-81ED-4DB2-BD59-A6C34878D82A}">
-                    <a16:rowId xmlns:a16="http://schemas.microsoft.com/office/drawing/2014/main" xmlns="" val="3503811886"/>
+                    <a16:rowId xmlns:a16="http://schemas.microsoft.com/office/drawing/2014/main" val="3503811886"/>
                   </a:ext>
                 </a:extLst>
               </a:tr>
@@ -6644,7 +6644,7 @@
           <p:cNvPr id="6" name="TextBox 5">
             <a:extLst>
               <a:ext uri="{FF2B5EF4-FFF2-40B4-BE49-F238E27FC236}">
-                <a16:creationId xmlns:a16="http://schemas.microsoft.com/office/drawing/2014/main" xmlns="" id="{5D4CEF27-D369-4530-80E1-625A71FC8861}"/>
+                <a16:creationId xmlns:a16="http://schemas.microsoft.com/office/drawing/2014/main" id="{5D4CEF27-D369-4530-80E1-625A71FC8861}"/>
               </a:ext>
             </a:extLst>
           </p:cNvPr>
@@ -6709,7 +6709,7 @@
           <p:cNvPr id="2" name="Title 1">
             <a:extLst>
               <a:ext uri="{FF2B5EF4-FFF2-40B4-BE49-F238E27FC236}">
-                <a16:creationId xmlns:a16="http://schemas.microsoft.com/office/drawing/2014/main" xmlns="" id="{670EFDDE-64AD-4380-895F-EF64F490BA48}"/>
+                <a16:creationId xmlns:a16="http://schemas.microsoft.com/office/drawing/2014/main" id="{670EFDDE-64AD-4380-895F-EF64F490BA48}"/>
               </a:ext>
             </a:extLst>
           </p:cNvPr>
@@ -6745,7 +6745,7 @@
           <p:cNvPr id="5" name="Picture 4">
             <a:extLst>
               <a:ext uri="{FF2B5EF4-FFF2-40B4-BE49-F238E27FC236}">
-                <a16:creationId xmlns:a16="http://schemas.microsoft.com/office/drawing/2014/main" xmlns="" id="{A3D0DFD0-E7BE-4A6B-8750-106FF063D887}"/>
+                <a16:creationId xmlns:a16="http://schemas.microsoft.com/office/drawing/2014/main" id="{A3D0DFD0-E7BE-4A6B-8750-106FF063D887}"/>
               </a:ext>
             </a:extLst>
           </p:cNvPr>
@@ -6781,7 +6781,7 @@
           <p:cNvPr id="4" name="Table 3">
             <a:extLst>
               <a:ext uri="{FF2B5EF4-FFF2-40B4-BE49-F238E27FC236}">
-                <a16:creationId xmlns:a16="http://schemas.microsoft.com/office/drawing/2014/main" xmlns="" id="{A0A2FB27-FA87-47ED-838C-4AC666383E3A}"/>
+                <a16:creationId xmlns:a16="http://schemas.microsoft.com/office/drawing/2014/main" id="{A0A2FB27-FA87-47ED-838C-4AC666383E3A}"/>
               </a:ext>
             </a:extLst>
           </p:cNvPr>
@@ -6810,14 +6810,14 @@
                 <a:gridCol w="3223658">
                   <a:extLst>
                     <a:ext uri="{9D8B030D-6E8A-4147-A177-3AD203B41FA5}">
-                      <a16:colId xmlns:a16="http://schemas.microsoft.com/office/drawing/2014/main" xmlns="" val="1260642711"/>
+                      <a16:colId xmlns:a16="http://schemas.microsoft.com/office/drawing/2014/main" val="1260642711"/>
                     </a:ext>
                   </a:extLst>
                 </a:gridCol>
                 <a:gridCol w="7480695">
                   <a:extLst>
                     <a:ext uri="{9D8B030D-6E8A-4147-A177-3AD203B41FA5}">
-                      <a16:colId xmlns:a16="http://schemas.microsoft.com/office/drawing/2014/main" xmlns="" val="3268955320"/>
+                      <a16:colId xmlns:a16="http://schemas.microsoft.com/office/drawing/2014/main" val="3268955320"/>
                     </a:ext>
                   </a:extLst>
                 </a:gridCol>
@@ -6851,7 +6851,7 @@
                 </a:tc>
                 <a:extLst>
                   <a:ext uri="{0D108BD9-81ED-4DB2-BD59-A6C34878D82A}">
-                    <a16:rowId xmlns:a16="http://schemas.microsoft.com/office/drawing/2014/main" xmlns="" val="4216933777"/>
+                    <a16:rowId xmlns:a16="http://schemas.microsoft.com/office/drawing/2014/main" val="4216933777"/>
                   </a:ext>
                 </a:extLst>
               </a:tr>
@@ -6885,7 +6885,7 @@
                 </a:tc>
                 <a:extLst>
                   <a:ext uri="{0D108BD9-81ED-4DB2-BD59-A6C34878D82A}">
-                    <a16:rowId xmlns:a16="http://schemas.microsoft.com/office/drawing/2014/main" xmlns="" val="793376613"/>
+                    <a16:rowId xmlns:a16="http://schemas.microsoft.com/office/drawing/2014/main" val="793376613"/>
                   </a:ext>
                 </a:extLst>
               </a:tr>
@@ -6949,7 +6949,7 @@
                 </a:tc>
                 <a:extLst>
                   <a:ext uri="{0D108BD9-81ED-4DB2-BD59-A6C34878D82A}">
-                    <a16:rowId xmlns:a16="http://schemas.microsoft.com/office/drawing/2014/main" xmlns="" val="3043844639"/>
+                    <a16:rowId xmlns:a16="http://schemas.microsoft.com/office/drawing/2014/main" val="3043844639"/>
                   </a:ext>
                 </a:extLst>
               </a:tr>
@@ -6983,7 +6983,7 @@
                 </a:tc>
                 <a:extLst>
                   <a:ext uri="{0D108BD9-81ED-4DB2-BD59-A6C34878D82A}">
-                    <a16:rowId xmlns:a16="http://schemas.microsoft.com/office/drawing/2014/main" xmlns="" val="58641842"/>
+                    <a16:rowId xmlns:a16="http://schemas.microsoft.com/office/drawing/2014/main" val="58641842"/>
                   </a:ext>
                 </a:extLst>
               </a:tr>
@@ -7025,7 +7025,7 @@
                 </a:tc>
                 <a:extLst>
                   <a:ext uri="{0D108BD9-81ED-4DB2-BD59-A6C34878D82A}">
-                    <a16:rowId xmlns:a16="http://schemas.microsoft.com/office/drawing/2014/main" xmlns="" val="977593107"/>
+                    <a16:rowId xmlns:a16="http://schemas.microsoft.com/office/drawing/2014/main" val="977593107"/>
                   </a:ext>
                 </a:extLst>
               </a:tr>
@@ -7059,7 +7059,7 @@
                 </a:tc>
                 <a:extLst>
                   <a:ext uri="{0D108BD9-81ED-4DB2-BD59-A6C34878D82A}">
-                    <a16:rowId xmlns:a16="http://schemas.microsoft.com/office/drawing/2014/main" xmlns="" val="3989650045"/>
+                    <a16:rowId xmlns:a16="http://schemas.microsoft.com/office/drawing/2014/main" val="3989650045"/>
                   </a:ext>
                 </a:extLst>
               </a:tr>
@@ -7102,7 +7102,7 @@
           <p:cNvPr id="2" name="Title 1">
             <a:extLst>
               <a:ext uri="{FF2B5EF4-FFF2-40B4-BE49-F238E27FC236}">
-                <a16:creationId xmlns:a16="http://schemas.microsoft.com/office/drawing/2014/main" xmlns="" id="{670EFDDE-64AD-4380-895F-EF64F490BA48}"/>
+                <a16:creationId xmlns:a16="http://schemas.microsoft.com/office/drawing/2014/main" id="{670EFDDE-64AD-4380-895F-EF64F490BA48}"/>
               </a:ext>
             </a:extLst>
           </p:cNvPr>
@@ -7138,7 +7138,7 @@
           <p:cNvPr id="5" name="Picture 4">
             <a:extLst>
               <a:ext uri="{FF2B5EF4-FFF2-40B4-BE49-F238E27FC236}">
-                <a16:creationId xmlns:a16="http://schemas.microsoft.com/office/drawing/2014/main" xmlns="" id="{A3D0DFD0-E7BE-4A6B-8750-106FF063D887}"/>
+                <a16:creationId xmlns:a16="http://schemas.microsoft.com/office/drawing/2014/main" id="{A3D0DFD0-E7BE-4A6B-8750-106FF063D887}"/>
               </a:ext>
             </a:extLst>
           </p:cNvPr>
@@ -7174,7 +7174,7 @@
           <p:cNvPr id="3" name="TextBox 2">
             <a:extLst>
               <a:ext uri="{FF2B5EF4-FFF2-40B4-BE49-F238E27FC236}">
-                <a16:creationId xmlns:a16="http://schemas.microsoft.com/office/drawing/2014/main" xmlns="" id="{4E84A00E-81D6-4BC1-9B69-CD6BE226E6D1}"/>
+                <a16:creationId xmlns:a16="http://schemas.microsoft.com/office/drawing/2014/main" id="{4E84A00E-81D6-4BC1-9B69-CD6BE226E6D1}"/>
               </a:ext>
             </a:extLst>
           </p:cNvPr>
@@ -7248,7 +7248,7 @@
           <p:cNvPr id="2" name="Title 1">
             <a:extLst>
               <a:ext uri="{FF2B5EF4-FFF2-40B4-BE49-F238E27FC236}">
-                <a16:creationId xmlns:a16="http://schemas.microsoft.com/office/drawing/2014/main" xmlns="" id="{670EFDDE-64AD-4380-895F-EF64F490BA48}"/>
+                <a16:creationId xmlns:a16="http://schemas.microsoft.com/office/drawing/2014/main" id="{670EFDDE-64AD-4380-895F-EF64F490BA48}"/>
               </a:ext>
             </a:extLst>
           </p:cNvPr>
@@ -7284,7 +7284,7 @@
           <p:cNvPr id="5" name="Picture 4">
             <a:extLst>
               <a:ext uri="{FF2B5EF4-FFF2-40B4-BE49-F238E27FC236}">
-                <a16:creationId xmlns:a16="http://schemas.microsoft.com/office/drawing/2014/main" xmlns="" id="{A3D0DFD0-E7BE-4A6B-8750-106FF063D887}"/>
+                <a16:creationId xmlns:a16="http://schemas.microsoft.com/office/drawing/2014/main" id="{A3D0DFD0-E7BE-4A6B-8750-106FF063D887}"/>
               </a:ext>
             </a:extLst>
           </p:cNvPr>
@@ -7320,7 +7320,7 @@
           <p:cNvPr id="3" name="TextBox 2">
             <a:extLst>
               <a:ext uri="{FF2B5EF4-FFF2-40B4-BE49-F238E27FC236}">
-                <a16:creationId xmlns:a16="http://schemas.microsoft.com/office/drawing/2014/main" xmlns="" id="{4E84A00E-81D6-4BC1-9B69-CD6BE226E6D1}"/>
+                <a16:creationId xmlns:a16="http://schemas.microsoft.com/office/drawing/2014/main" id="{4E84A00E-81D6-4BC1-9B69-CD6BE226E6D1}"/>
               </a:ext>
             </a:extLst>
           </p:cNvPr>
@@ -7361,7 +7361,7 @@
           <p:cNvPr id="6" name="Table 5">
             <a:extLst>
               <a:ext uri="{FF2B5EF4-FFF2-40B4-BE49-F238E27FC236}">
-                <a16:creationId xmlns:a16="http://schemas.microsoft.com/office/drawing/2014/main" xmlns="" id="{23772921-A77F-495D-8374-13248AB65B63}"/>
+                <a16:creationId xmlns:a16="http://schemas.microsoft.com/office/drawing/2014/main" id="{23772921-A77F-495D-8374-13248AB65B63}"/>
               </a:ext>
             </a:extLst>
           </p:cNvPr>
@@ -7390,14 +7390,14 @@
                 <a:gridCol w="3223658">
                   <a:extLst>
                     <a:ext uri="{9D8B030D-6E8A-4147-A177-3AD203B41FA5}">
-                      <a16:colId xmlns:a16="http://schemas.microsoft.com/office/drawing/2014/main" xmlns="" val="1260642711"/>
+                      <a16:colId xmlns:a16="http://schemas.microsoft.com/office/drawing/2014/main" val="1260642711"/>
                     </a:ext>
                   </a:extLst>
                 </a:gridCol>
                 <a:gridCol w="7480695">
                   <a:extLst>
                     <a:ext uri="{9D8B030D-6E8A-4147-A177-3AD203B41FA5}">
-                      <a16:colId xmlns:a16="http://schemas.microsoft.com/office/drawing/2014/main" xmlns="" val="3268955320"/>
+                      <a16:colId xmlns:a16="http://schemas.microsoft.com/office/drawing/2014/main" val="3268955320"/>
                     </a:ext>
                   </a:extLst>
                 </a:gridCol>
@@ -7431,7 +7431,7 @@
                 </a:tc>
                 <a:extLst>
                   <a:ext uri="{0D108BD9-81ED-4DB2-BD59-A6C34878D82A}">
-                    <a16:rowId xmlns:a16="http://schemas.microsoft.com/office/drawing/2014/main" xmlns="" val="4216933777"/>
+                    <a16:rowId xmlns:a16="http://schemas.microsoft.com/office/drawing/2014/main" val="4216933777"/>
                   </a:ext>
                 </a:extLst>
               </a:tr>
@@ -7473,7 +7473,7 @@
                 </a:tc>
                 <a:extLst>
                   <a:ext uri="{0D108BD9-81ED-4DB2-BD59-A6C34878D82A}">
-                    <a16:rowId xmlns:a16="http://schemas.microsoft.com/office/drawing/2014/main" xmlns="" val="793376613"/>
+                    <a16:rowId xmlns:a16="http://schemas.microsoft.com/office/drawing/2014/main" val="793376613"/>
                   </a:ext>
                 </a:extLst>
               </a:tr>
@@ -7524,7 +7524,7 @@
                 </a:tc>
                 <a:extLst>
                   <a:ext uri="{0D108BD9-81ED-4DB2-BD59-A6C34878D82A}">
-                    <a16:rowId xmlns:a16="http://schemas.microsoft.com/office/drawing/2014/main" xmlns="" val="3043844639"/>
+                    <a16:rowId xmlns:a16="http://schemas.microsoft.com/office/drawing/2014/main" val="3043844639"/>
                   </a:ext>
                 </a:extLst>
               </a:tr>
@@ -7561,7 +7561,7 @@
                 </a:tc>
                 <a:extLst>
                   <a:ext uri="{0D108BD9-81ED-4DB2-BD59-A6C34878D82A}">
-                    <a16:rowId xmlns:a16="http://schemas.microsoft.com/office/drawing/2014/main" xmlns="" val="58641842"/>
+                    <a16:rowId xmlns:a16="http://schemas.microsoft.com/office/drawing/2014/main" val="58641842"/>
                   </a:ext>
                 </a:extLst>
               </a:tr>
@@ -7594,7 +7594,7 @@
                 </a:tc>
                 <a:extLst>
                   <a:ext uri="{0D108BD9-81ED-4DB2-BD59-A6C34878D82A}">
-                    <a16:rowId xmlns:a16="http://schemas.microsoft.com/office/drawing/2014/main" xmlns="" val="977593107"/>
+                    <a16:rowId xmlns:a16="http://schemas.microsoft.com/office/drawing/2014/main" val="977593107"/>
                   </a:ext>
                 </a:extLst>
               </a:tr>
@@ -7627,7 +7627,7 @@
                 </a:tc>
                 <a:extLst>
                   <a:ext uri="{0D108BD9-81ED-4DB2-BD59-A6C34878D82A}">
-                    <a16:rowId xmlns:a16="http://schemas.microsoft.com/office/drawing/2014/main" xmlns="" val="4040519835"/>
+                    <a16:rowId xmlns:a16="http://schemas.microsoft.com/office/drawing/2014/main" val="4040519835"/>
                   </a:ext>
                 </a:extLst>
               </a:tr>
@@ -7635,6 +7635,65 @@
           </a:graphicData>
         </a:graphic>
       </p:graphicFrame>
+      <p:sp>
+        <p:nvSpPr>
+          <p:cNvPr id="4" name="TextBox 3">
+            <a:extLst>
+              <a:ext uri="{FF2B5EF4-FFF2-40B4-BE49-F238E27FC236}">
+                <a16:creationId xmlns:a16="http://schemas.microsoft.com/office/drawing/2014/main" id="{40C38C07-7AC9-4886-9693-20D7DA251CC3}"/>
+              </a:ext>
+            </a:extLst>
+          </p:cNvPr>
+          <p:cNvSpPr txBox="1"/>
+          <p:nvPr/>
+        </p:nvSpPr>
+        <p:spPr>
+          <a:xfrm>
+            <a:off x="654340" y="5046983"/>
+            <a:ext cx="10704353" cy="923330"/>
+          </a:xfrm>
+          <a:prstGeom prst="rect">
+            <a:avLst/>
+          </a:prstGeom>
+          <a:noFill/>
+        </p:spPr>
+        <p:txBody>
+          <a:bodyPr wrap="square" rtlCol="0">
+            <a:spAutoFit/>
+          </a:bodyPr>
+          <a:lstStyle/>
+          <a:p>
+            <a:r>
+              <a:rPr lang="en-US" dirty="0"/>
+              <a:t>The issue when several </a:t>
+            </a:r>
+            <a:r>
+              <a:rPr lang="en-US" dirty="0" err="1"/>
+              <a:t>SignUp</a:t>
+            </a:r>
+            <a:r>
+              <a:rPr lang="en-US" dirty="0"/>
+              <a:t> Functions are booking the last place is solved by predefining Places in </a:t>
+            </a:r>
+            <a:r>
+              <a:rPr lang="en-US" dirty="0" err="1"/>
+              <a:t>CoursePlaces</a:t>
+            </a:r>
+            <a:r>
+              <a:rPr lang="en-US" dirty="0"/>
+              <a:t> table. Then instead of insert operation we use update operation. Update operation uses optimistic locking with </a:t>
+            </a:r>
+            <a:r>
+              <a:rPr lang="en-US" dirty="0" err="1"/>
+              <a:t>Etags</a:t>
+            </a:r>
+            <a:r>
+              <a:rPr lang="en-US" dirty="0"/>
+              <a:t>. So we delegate responsibility of solving this concurrency issue to Azure Table Storage.</a:t>
+            </a:r>
+          </a:p>
+        </p:txBody>
+      </p:sp>
     </p:spTree>
     <p:extLst>
       <p:ext uri="{BB962C8B-B14F-4D97-AF65-F5344CB8AC3E}">
@@ -7670,7 +7729,7 @@
           <p:cNvPr id="2" name="Title 1">
             <a:extLst>
               <a:ext uri="{FF2B5EF4-FFF2-40B4-BE49-F238E27FC236}">
-                <a16:creationId xmlns:a16="http://schemas.microsoft.com/office/drawing/2014/main" xmlns="" id="{670EFDDE-64AD-4380-895F-EF64F490BA48}"/>
+                <a16:creationId xmlns:a16="http://schemas.microsoft.com/office/drawing/2014/main" id="{670EFDDE-64AD-4380-895F-EF64F490BA48}"/>
               </a:ext>
             </a:extLst>
           </p:cNvPr>
@@ -7706,7 +7765,7 @@
           <p:cNvPr id="5" name="Picture 4">
             <a:extLst>
               <a:ext uri="{FF2B5EF4-FFF2-40B4-BE49-F238E27FC236}">
-                <a16:creationId xmlns:a16="http://schemas.microsoft.com/office/drawing/2014/main" xmlns="" id="{A3D0DFD0-E7BE-4A6B-8750-106FF063D887}"/>
+                <a16:creationId xmlns:a16="http://schemas.microsoft.com/office/drawing/2014/main" id="{A3D0DFD0-E7BE-4A6B-8750-106FF063D887}"/>
               </a:ext>
             </a:extLst>
           </p:cNvPr>
@@ -7742,7 +7801,7 @@
           <p:cNvPr id="3" name="TextBox 2">
             <a:extLst>
               <a:ext uri="{FF2B5EF4-FFF2-40B4-BE49-F238E27FC236}">
-                <a16:creationId xmlns:a16="http://schemas.microsoft.com/office/drawing/2014/main" xmlns="" id="{4E84A00E-81D6-4BC1-9B69-CD6BE226E6D1}"/>
+                <a16:creationId xmlns:a16="http://schemas.microsoft.com/office/drawing/2014/main" id="{4E84A00E-81D6-4BC1-9B69-CD6BE226E6D1}"/>
               </a:ext>
             </a:extLst>
           </p:cNvPr>

</xml_diff>